<commit_message>
added sections for the actuator and stepper motors.
</commit_message>
<xml_diff>
--- a/Documents/Presentations/HerbertPresentation.pptx
+++ b/Documents/Presentations/HerbertPresentation.pptx
@@ -121,7 +121,7 @@
   </p:defaultTextStyle>
   <p:extLst>
     <p:ext uri="{EFAFB233-063F-42B5-8137-9DF3F51BA10A}">
-      <p15:sldGuideLst xmlns:p15="http://schemas.microsoft.com/office/powerpoint/2012/main">
+      <p15:sldGuideLst xmlns:p15="http://schemas.microsoft.com/office/powerpoint/2012/main" xmlns="">
         <p15:guide id="1" orient="horz" pos="2160">
           <p15:clr>
             <a:srgbClr val="A4A3A4"/>
@@ -195,7 +195,7 @@
           <a:noFill/>
           <a:extLst>
             <a:ext uri="{909E8E84-426E-40dd-AFC4-6F175D3DCCD1}">
-              <a14:hiddenFill xmlns:a14="http://schemas.microsoft.com/office/drawing/2010/main" xmlns="">
+              <a14:hiddenFill xmlns:a14="http://schemas.microsoft.com/office/drawing/2010/main">
                 <a:solidFill>
                   <a:srgbClr val="FFFFFF"/>
                 </a:solidFill>
@@ -255,7 +255,7 @@
             </a:ln>
             <a:extLst>
               <a:ext uri="{91240B29-F687-4f45-9708-019B960494DF}">
-                <a14:hiddenLine xmlns:a14="http://schemas.microsoft.com/office/drawing/2010/main" xmlns="" w="9525">
+                <a14:hiddenLine xmlns:a14="http://schemas.microsoft.com/office/drawing/2010/main" w="9525">
                   <a:solidFill>
                     <a:srgbClr val="000000"/>
                   </a:solidFill>
@@ -345,7 +345,7 @@
             </a:ln>
             <a:extLst>
               <a:ext uri="{91240B29-F687-4f45-9708-019B960494DF}">
-                <a14:hiddenLine xmlns:a14="http://schemas.microsoft.com/office/drawing/2010/main" xmlns="" w="9525">
+                <a14:hiddenLine xmlns:a14="http://schemas.microsoft.com/office/drawing/2010/main" w="9525">
                   <a:solidFill>
                     <a:srgbClr val="000000"/>
                   </a:solidFill>
@@ -435,7 +435,7 @@
             </a:ln>
             <a:extLst>
               <a:ext uri="{91240B29-F687-4f45-9708-019B960494DF}">
-                <a14:hiddenLine xmlns:a14="http://schemas.microsoft.com/office/drawing/2010/main" xmlns="" w="9525">
+                <a14:hiddenLine xmlns:a14="http://schemas.microsoft.com/office/drawing/2010/main" w="9525">
                   <a:solidFill>
                     <a:srgbClr val="000000"/>
                   </a:solidFill>
@@ -469,7 +469,7 @@
             </a:ln>
             <a:extLst>
               <a:ext uri="{91240B29-F687-4f45-9708-019B960494DF}">
-                <a14:hiddenLine xmlns:a14="http://schemas.microsoft.com/office/drawing/2010/main" xmlns="" w="9525">
+                <a14:hiddenLine xmlns:a14="http://schemas.microsoft.com/office/drawing/2010/main" w="9525">
                   <a:solidFill>
                     <a:srgbClr val="000000"/>
                   </a:solidFill>
@@ -559,7 +559,7 @@
             </a:ln>
             <a:extLst>
               <a:ext uri="{91240B29-F687-4f45-9708-019B960494DF}">
-                <a14:hiddenLine xmlns:a14="http://schemas.microsoft.com/office/drawing/2010/main" xmlns="" w="9525">
+                <a14:hiddenLine xmlns:a14="http://schemas.microsoft.com/office/drawing/2010/main" w="9525">
                   <a:solidFill>
                     <a:srgbClr val="000000"/>
                   </a:solidFill>
@@ -621,7 +621,7 @@
             </a:ln>
             <a:extLst>
               <a:ext uri="{91240B29-F687-4f45-9708-019B960494DF}">
-                <a14:hiddenLine xmlns:a14="http://schemas.microsoft.com/office/drawing/2010/main" xmlns="" w="9525">
+                <a14:hiddenLine xmlns:a14="http://schemas.microsoft.com/office/drawing/2010/main" w="9525">
                   <a:solidFill>
                     <a:srgbClr val="000000"/>
                   </a:solidFill>
@@ -683,7 +683,7 @@
             </a:ln>
             <a:extLst>
               <a:ext uri="{91240B29-F687-4f45-9708-019B960494DF}">
-                <a14:hiddenLine xmlns:a14="http://schemas.microsoft.com/office/drawing/2010/main" xmlns="" w="9525">
+                <a14:hiddenLine xmlns:a14="http://schemas.microsoft.com/office/drawing/2010/main" w="9525">
                   <a:solidFill>
                     <a:srgbClr val="000000"/>
                   </a:solidFill>
@@ -773,7 +773,7 @@
             </a:ln>
             <a:extLst>
               <a:ext uri="{91240B29-F687-4f45-9708-019B960494DF}">
-                <a14:hiddenLine xmlns:a14="http://schemas.microsoft.com/office/drawing/2010/main" xmlns="" w="9525">
+                <a14:hiddenLine xmlns:a14="http://schemas.microsoft.com/office/drawing/2010/main" w="9525">
                   <a:solidFill>
                     <a:srgbClr val="000000"/>
                   </a:solidFill>
@@ -835,7 +835,7 @@
             </a:ln>
             <a:extLst>
               <a:ext uri="{91240B29-F687-4f45-9708-019B960494DF}">
-                <a14:hiddenLine xmlns:a14="http://schemas.microsoft.com/office/drawing/2010/main" xmlns="" w="9525">
+                <a14:hiddenLine xmlns:a14="http://schemas.microsoft.com/office/drawing/2010/main" w="9525">
                   <a:solidFill>
                     <a:srgbClr val="000000"/>
                   </a:solidFill>
@@ -897,7 +897,7 @@
             </a:ln>
             <a:extLst>
               <a:ext uri="{91240B29-F687-4f45-9708-019B960494DF}">
-                <a14:hiddenLine xmlns:a14="http://schemas.microsoft.com/office/drawing/2010/main" xmlns="" w="9525">
+                <a14:hiddenLine xmlns:a14="http://schemas.microsoft.com/office/drawing/2010/main" w="9525">
                   <a:solidFill>
                     <a:srgbClr val="000000"/>
                   </a:solidFill>
@@ -987,7 +987,7 @@
             </a:ln>
             <a:extLst>
               <a:ext uri="{91240B29-F687-4f45-9708-019B960494DF}">
-                <a14:hiddenLine xmlns:a14="http://schemas.microsoft.com/office/drawing/2010/main" xmlns="" w="9525">
+                <a14:hiddenLine xmlns:a14="http://schemas.microsoft.com/office/drawing/2010/main" w="9525">
                   <a:solidFill>
                     <a:srgbClr val="000000"/>
                   </a:solidFill>
@@ -1077,7 +1077,7 @@
             </a:ln>
             <a:extLst>
               <a:ext uri="{91240B29-F687-4f45-9708-019B960494DF}">
-                <a14:hiddenLine xmlns:a14="http://schemas.microsoft.com/office/drawing/2010/main" xmlns="" w="9525">
+                <a14:hiddenLine xmlns:a14="http://schemas.microsoft.com/office/drawing/2010/main" w="9525">
                   <a:solidFill>
                     <a:srgbClr val="000000"/>
                   </a:solidFill>
@@ -1139,7 +1139,7 @@
             </a:ln>
             <a:extLst>
               <a:ext uri="{91240B29-F687-4f45-9708-019B960494DF}">
-                <a14:hiddenLine xmlns:a14="http://schemas.microsoft.com/office/drawing/2010/main" xmlns="" w="9525">
+                <a14:hiddenLine xmlns:a14="http://schemas.microsoft.com/office/drawing/2010/main" w="9525">
                   <a:solidFill>
                     <a:srgbClr val="000000"/>
                   </a:solidFill>
@@ -1249,7 +1249,7 @@
             </a:ln>
             <a:extLst>
               <a:ext uri="{91240B29-F687-4f45-9708-019B960494DF}">
-                <a14:hiddenLine xmlns:a14="http://schemas.microsoft.com/office/drawing/2010/main" xmlns="" w="9525">
+                <a14:hiddenLine xmlns:a14="http://schemas.microsoft.com/office/drawing/2010/main" w="9525">
                   <a:solidFill>
                     <a:srgbClr val="000000"/>
                   </a:solidFill>
@@ -1311,7 +1311,7 @@
             </a:ln>
             <a:extLst>
               <a:ext uri="{91240B29-F687-4f45-9708-019B960494DF}">
-                <a14:hiddenLine xmlns:a14="http://schemas.microsoft.com/office/drawing/2010/main" xmlns="" w="9525">
+                <a14:hiddenLine xmlns:a14="http://schemas.microsoft.com/office/drawing/2010/main" w="9525">
                   <a:solidFill>
                     <a:srgbClr val="000000"/>
                   </a:solidFill>
@@ -1401,7 +1401,7 @@
             </a:ln>
             <a:extLst>
               <a:ext uri="{91240B29-F687-4f45-9708-019B960494DF}">
-                <a14:hiddenLine xmlns:a14="http://schemas.microsoft.com/office/drawing/2010/main" xmlns="" w="9525">
+                <a14:hiddenLine xmlns:a14="http://schemas.microsoft.com/office/drawing/2010/main" w="9525">
                   <a:solidFill>
                     <a:srgbClr val="000000"/>
                   </a:solidFill>
@@ -1491,7 +1491,7 @@
             </a:ln>
             <a:extLst>
               <a:ext uri="{91240B29-F687-4f45-9708-019B960494DF}">
-                <a14:hiddenLine xmlns:a14="http://schemas.microsoft.com/office/drawing/2010/main" xmlns="" w="9525">
+                <a14:hiddenLine xmlns:a14="http://schemas.microsoft.com/office/drawing/2010/main" w="9525">
                   <a:solidFill>
                     <a:srgbClr val="000000"/>
                   </a:solidFill>
@@ -1553,7 +1553,7 @@
             </a:ln>
             <a:extLst>
               <a:ext uri="{91240B29-F687-4f45-9708-019B960494DF}">
-                <a14:hiddenLine xmlns:a14="http://schemas.microsoft.com/office/drawing/2010/main" xmlns="" w="9525">
+                <a14:hiddenLine xmlns:a14="http://schemas.microsoft.com/office/drawing/2010/main" w="9525">
                   <a:solidFill>
                     <a:srgbClr val="000000"/>
                   </a:solidFill>
@@ -1643,7 +1643,7 @@
             </a:ln>
             <a:extLst>
               <a:ext uri="{91240B29-F687-4f45-9708-019B960494DF}">
-                <a14:hiddenLine xmlns:a14="http://schemas.microsoft.com/office/drawing/2010/main" xmlns="" w="9525">
+                <a14:hiddenLine xmlns:a14="http://schemas.microsoft.com/office/drawing/2010/main" w="9525">
                   <a:solidFill>
                     <a:srgbClr val="000000"/>
                   </a:solidFill>
@@ -1733,7 +1733,7 @@
             </a:ln>
             <a:extLst>
               <a:ext uri="{91240B29-F687-4f45-9708-019B960494DF}">
-                <a14:hiddenLine xmlns:a14="http://schemas.microsoft.com/office/drawing/2010/main" xmlns="" w="9525">
+                <a14:hiddenLine xmlns:a14="http://schemas.microsoft.com/office/drawing/2010/main" w="9525">
                   <a:solidFill>
                     <a:srgbClr val="000000"/>
                   </a:solidFill>
@@ -1789,7 +1789,7 @@
             </a:ln>
             <a:extLst>
               <a:ext uri="{91240B29-F687-4f45-9708-019B960494DF}">
-                <a14:hiddenLine xmlns:a14="http://schemas.microsoft.com/office/drawing/2010/main" xmlns="" w="9525">
+                <a14:hiddenLine xmlns:a14="http://schemas.microsoft.com/office/drawing/2010/main" w="9525">
                   <a:solidFill>
                     <a:srgbClr val="000000"/>
                   </a:solidFill>
@@ -1879,7 +1879,7 @@
             </a:ln>
             <a:extLst>
               <a:ext uri="{91240B29-F687-4f45-9708-019B960494DF}">
-                <a14:hiddenLine xmlns:a14="http://schemas.microsoft.com/office/drawing/2010/main" xmlns="" w="9525">
+                <a14:hiddenLine xmlns:a14="http://schemas.microsoft.com/office/drawing/2010/main" w="9525">
                   <a:solidFill>
                     <a:srgbClr val="000000"/>
                   </a:solidFill>
@@ -1935,7 +1935,7 @@
             </a:ln>
             <a:extLst>
               <a:ext uri="{91240B29-F687-4f45-9708-019B960494DF}">
-                <a14:hiddenLine xmlns:a14="http://schemas.microsoft.com/office/drawing/2010/main" xmlns="" w="9525">
+                <a14:hiddenLine xmlns:a14="http://schemas.microsoft.com/office/drawing/2010/main" w="9525">
                   <a:solidFill>
                     <a:srgbClr val="000000"/>
                   </a:solidFill>
@@ -2025,7 +2025,7 @@
             </a:ln>
             <a:extLst>
               <a:ext uri="{91240B29-F687-4f45-9708-019B960494DF}">
-                <a14:hiddenLine xmlns:a14="http://schemas.microsoft.com/office/drawing/2010/main" xmlns="" w="9525">
+                <a14:hiddenLine xmlns:a14="http://schemas.microsoft.com/office/drawing/2010/main" w="9525">
                   <a:solidFill>
                     <a:srgbClr val="000000"/>
                   </a:solidFill>
@@ -2093,7 +2093,7 @@
             </a:ln>
             <a:extLst>
               <a:ext uri="{91240B29-F687-4f45-9708-019B960494DF}">
-                <a14:hiddenLine xmlns:a14="http://schemas.microsoft.com/office/drawing/2010/main" xmlns="" w="9525">
+                <a14:hiddenLine xmlns:a14="http://schemas.microsoft.com/office/drawing/2010/main" w="9525">
                   <a:solidFill>
                     <a:srgbClr val="000000"/>
                   </a:solidFill>
@@ -2183,7 +2183,7 @@
             </a:ln>
             <a:extLst>
               <a:ext uri="{91240B29-F687-4f45-9708-019B960494DF}">
-                <a14:hiddenLine xmlns:a14="http://schemas.microsoft.com/office/drawing/2010/main" xmlns="" w="9525">
+                <a14:hiddenLine xmlns:a14="http://schemas.microsoft.com/office/drawing/2010/main" w="9525">
                   <a:solidFill>
                     <a:srgbClr val="000000"/>
                   </a:solidFill>
@@ -2251,7 +2251,7 @@
             </a:ln>
             <a:extLst>
               <a:ext uri="{91240B29-F687-4f45-9708-019B960494DF}">
-                <a14:hiddenLine xmlns:a14="http://schemas.microsoft.com/office/drawing/2010/main" xmlns="" w="9525">
+                <a14:hiddenLine xmlns:a14="http://schemas.microsoft.com/office/drawing/2010/main" w="9525">
                   <a:solidFill>
                     <a:srgbClr val="000000"/>
                   </a:solidFill>
@@ -2341,7 +2341,7 @@
             </a:ln>
             <a:extLst>
               <a:ext uri="{91240B29-F687-4f45-9708-019B960494DF}">
-                <a14:hiddenLine xmlns:a14="http://schemas.microsoft.com/office/drawing/2010/main" xmlns="" w="9525">
+                <a14:hiddenLine xmlns:a14="http://schemas.microsoft.com/office/drawing/2010/main" w="9525">
                   <a:solidFill>
                     <a:srgbClr val="000000"/>
                   </a:solidFill>
@@ -2375,7 +2375,7 @@
             </a:ln>
             <a:extLst>
               <a:ext uri="{91240B29-F687-4f45-9708-019B960494DF}">
-                <a14:hiddenLine xmlns:a14="http://schemas.microsoft.com/office/drawing/2010/main" xmlns="" w="9525">
+                <a14:hiddenLine xmlns:a14="http://schemas.microsoft.com/office/drawing/2010/main" w="9525">
                   <a:solidFill>
                     <a:srgbClr val="000000"/>
                   </a:solidFill>
@@ -2465,7 +2465,7 @@
             </a:ln>
             <a:extLst>
               <a:ext uri="{91240B29-F687-4f45-9708-019B960494DF}">
-                <a14:hiddenLine xmlns:a14="http://schemas.microsoft.com/office/drawing/2010/main" xmlns="" w="9525">
+                <a14:hiddenLine xmlns:a14="http://schemas.microsoft.com/office/drawing/2010/main" w="9525">
                   <a:solidFill>
                     <a:srgbClr val="000000"/>
                   </a:solidFill>
@@ -2527,7 +2527,7 @@
             </a:ln>
             <a:extLst>
               <a:ext uri="{91240B29-F687-4f45-9708-019B960494DF}">
-                <a14:hiddenLine xmlns:a14="http://schemas.microsoft.com/office/drawing/2010/main" xmlns="" w="9525">
+                <a14:hiddenLine xmlns:a14="http://schemas.microsoft.com/office/drawing/2010/main" w="9525">
                   <a:solidFill>
                     <a:srgbClr val="000000"/>
                   </a:solidFill>
@@ -2589,7 +2589,7 @@
             </a:ln>
             <a:extLst>
               <a:ext uri="{91240B29-F687-4f45-9708-019B960494DF}">
-                <a14:hiddenLine xmlns:a14="http://schemas.microsoft.com/office/drawing/2010/main" xmlns="" w="9525">
+                <a14:hiddenLine xmlns:a14="http://schemas.microsoft.com/office/drawing/2010/main" w="9525">
                   <a:solidFill>
                     <a:srgbClr val="000000"/>
                   </a:solidFill>
@@ -2679,7 +2679,7 @@
             </a:ln>
             <a:extLst>
               <a:ext uri="{91240B29-F687-4f45-9708-019B960494DF}">
-                <a14:hiddenLine xmlns:a14="http://schemas.microsoft.com/office/drawing/2010/main" xmlns="" w="9525">
+                <a14:hiddenLine xmlns:a14="http://schemas.microsoft.com/office/drawing/2010/main" w="9525">
                   <a:solidFill>
                     <a:srgbClr val="000000"/>
                   </a:solidFill>
@@ -2747,7 +2747,7 @@
             </a:ln>
             <a:extLst>
               <a:ext uri="{91240B29-F687-4f45-9708-019B960494DF}">
-                <a14:hiddenLine xmlns:a14="http://schemas.microsoft.com/office/drawing/2010/main" xmlns="" w="9525">
+                <a14:hiddenLine xmlns:a14="http://schemas.microsoft.com/office/drawing/2010/main" w="9525">
                   <a:solidFill>
                     <a:srgbClr val="000000"/>
                   </a:solidFill>
@@ -2809,7 +2809,7 @@
             </a:ln>
             <a:extLst>
               <a:ext uri="{91240B29-F687-4f45-9708-019B960494DF}">
-                <a14:hiddenLine xmlns:a14="http://schemas.microsoft.com/office/drawing/2010/main" xmlns="" w="9525">
+                <a14:hiddenLine xmlns:a14="http://schemas.microsoft.com/office/drawing/2010/main" w="9525">
                   <a:solidFill>
                     <a:srgbClr val="000000"/>
                   </a:solidFill>
@@ -2899,7 +2899,7 @@
             </a:ln>
             <a:extLst>
               <a:ext uri="{91240B29-F687-4f45-9708-019B960494DF}">
-                <a14:hiddenLine xmlns:a14="http://schemas.microsoft.com/office/drawing/2010/main" xmlns="" w="9525">
+                <a14:hiddenLine xmlns:a14="http://schemas.microsoft.com/office/drawing/2010/main" w="9525">
                   <a:solidFill>
                     <a:srgbClr val="000000"/>
                   </a:solidFill>
@@ -2961,7 +2961,7 @@
             </a:ln>
             <a:extLst>
               <a:ext uri="{91240B29-F687-4f45-9708-019B960494DF}">
-                <a14:hiddenLine xmlns:a14="http://schemas.microsoft.com/office/drawing/2010/main" xmlns="" w="9525">
+                <a14:hiddenLine xmlns:a14="http://schemas.microsoft.com/office/drawing/2010/main" w="9525">
                   <a:solidFill>
                     <a:srgbClr val="000000"/>
                   </a:solidFill>
@@ -3051,7 +3051,7 @@
             </a:ln>
             <a:extLst>
               <a:ext uri="{91240B29-F687-4f45-9708-019B960494DF}">
-                <a14:hiddenLine xmlns:a14="http://schemas.microsoft.com/office/drawing/2010/main" xmlns="" w="9525">
+                <a14:hiddenLine xmlns:a14="http://schemas.microsoft.com/office/drawing/2010/main" w="9525">
                   <a:solidFill>
                     <a:srgbClr val="000000"/>
                   </a:solidFill>
@@ -3113,7 +3113,7 @@
             </a:ln>
             <a:extLst>
               <a:ext uri="{91240B29-F687-4f45-9708-019B960494DF}">
-                <a14:hiddenLine xmlns:a14="http://schemas.microsoft.com/office/drawing/2010/main" xmlns="" w="9525">
+                <a14:hiddenLine xmlns:a14="http://schemas.microsoft.com/office/drawing/2010/main" w="9525">
                   <a:solidFill>
                     <a:srgbClr val="000000"/>
                   </a:solidFill>
@@ -3203,7 +3203,7 @@
             </a:ln>
             <a:extLst>
               <a:ext uri="{91240B29-F687-4f45-9708-019B960494DF}">
-                <a14:hiddenLine xmlns:a14="http://schemas.microsoft.com/office/drawing/2010/main" xmlns="" w="9525">
+                <a14:hiddenLine xmlns:a14="http://schemas.microsoft.com/office/drawing/2010/main" w="9525">
                   <a:solidFill>
                     <a:srgbClr val="000000"/>
                   </a:solidFill>
@@ -3237,7 +3237,7 @@
             </a:ln>
             <a:extLst>
               <a:ext uri="{91240B29-F687-4f45-9708-019B960494DF}">
-                <a14:hiddenLine xmlns:a14="http://schemas.microsoft.com/office/drawing/2010/main" xmlns="" w="9525">
+                <a14:hiddenLine xmlns:a14="http://schemas.microsoft.com/office/drawing/2010/main" w="9525">
                   <a:solidFill>
                     <a:srgbClr val="000000"/>
                   </a:solidFill>
@@ -3302,7 +3302,7 @@
             </a:ln>
             <a:extLst>
               <a:ext uri="{91240B29-F687-4f45-9708-019B960494DF}">
-                <a14:hiddenLine xmlns:a14="http://schemas.microsoft.com/office/drawing/2010/main" xmlns="" w="9525">
+                <a14:hiddenLine xmlns:a14="http://schemas.microsoft.com/office/drawing/2010/main" w="9525">
                   <a:solidFill>
                     <a:srgbClr val="000000"/>
                   </a:solidFill>
@@ -3392,7 +3392,7 @@
             </a:ln>
             <a:extLst>
               <a:ext uri="{91240B29-F687-4f45-9708-019B960494DF}">
-                <a14:hiddenLine xmlns:a14="http://schemas.microsoft.com/office/drawing/2010/main" xmlns="" w="9525">
+                <a14:hiddenLine xmlns:a14="http://schemas.microsoft.com/office/drawing/2010/main" w="9525">
                   <a:solidFill>
                     <a:srgbClr val="000000"/>
                   </a:solidFill>
@@ -3454,7 +3454,7 @@
             </a:ln>
             <a:extLst>
               <a:ext uri="{91240B29-F687-4f45-9708-019B960494DF}">
-                <a14:hiddenLine xmlns:a14="http://schemas.microsoft.com/office/drawing/2010/main" xmlns="" w="9525">
+                <a14:hiddenLine xmlns:a14="http://schemas.microsoft.com/office/drawing/2010/main" w="9525">
                   <a:solidFill>
                     <a:srgbClr val="000000"/>
                   </a:solidFill>
@@ -3544,7 +3544,7 @@
             </a:ln>
             <a:extLst>
               <a:ext uri="{91240B29-F687-4f45-9708-019B960494DF}">
-                <a14:hiddenLine xmlns:a14="http://schemas.microsoft.com/office/drawing/2010/main" xmlns="" w="9525">
+                <a14:hiddenLine xmlns:a14="http://schemas.microsoft.com/office/drawing/2010/main" w="9525">
                   <a:solidFill>
                     <a:srgbClr val="000000"/>
                   </a:solidFill>
@@ -3634,7 +3634,7 @@
             </a:ln>
             <a:extLst>
               <a:ext uri="{91240B29-F687-4f45-9708-019B960494DF}">
-                <a14:hiddenLine xmlns:a14="http://schemas.microsoft.com/office/drawing/2010/main" xmlns="" w="9525">
+                <a14:hiddenLine xmlns:a14="http://schemas.microsoft.com/office/drawing/2010/main" w="9525">
                   <a:solidFill>
                     <a:srgbClr val="000000"/>
                   </a:solidFill>
@@ -3699,7 +3699,7 @@
             </a:ln>
             <a:extLst>
               <a:ext uri="{91240B29-F687-4f45-9708-019B960494DF}">
-                <a14:hiddenLine xmlns:a14="http://schemas.microsoft.com/office/drawing/2010/main" xmlns="" w="9525">
+                <a14:hiddenLine xmlns:a14="http://schemas.microsoft.com/office/drawing/2010/main" w="9525">
                   <a:solidFill>
                     <a:srgbClr val="000000"/>
                   </a:solidFill>
@@ -3761,7 +3761,7 @@
             </a:ln>
             <a:extLst>
               <a:ext uri="{91240B29-F687-4f45-9708-019B960494DF}">
-                <a14:hiddenLine xmlns:a14="http://schemas.microsoft.com/office/drawing/2010/main" xmlns="" w="9525">
+                <a14:hiddenLine xmlns:a14="http://schemas.microsoft.com/office/drawing/2010/main" w="9525">
                   <a:solidFill>
                     <a:srgbClr val="000000"/>
                   </a:solidFill>
@@ -3851,7 +3851,7 @@
             </a:ln>
             <a:extLst>
               <a:ext uri="{91240B29-F687-4f45-9708-019B960494DF}">
-                <a14:hiddenLine xmlns:a14="http://schemas.microsoft.com/office/drawing/2010/main" xmlns="" w="9525">
+                <a14:hiddenLine xmlns:a14="http://schemas.microsoft.com/office/drawing/2010/main" w="9525">
                   <a:solidFill>
                     <a:srgbClr val="000000"/>
                   </a:solidFill>
@@ -3941,7 +3941,7 @@
             </a:ln>
             <a:extLst>
               <a:ext uri="{91240B29-F687-4f45-9708-019B960494DF}">
-                <a14:hiddenLine xmlns:a14="http://schemas.microsoft.com/office/drawing/2010/main" xmlns="" w="9525">
+                <a14:hiddenLine xmlns:a14="http://schemas.microsoft.com/office/drawing/2010/main" w="9525">
                   <a:solidFill>
                     <a:srgbClr val="000000"/>
                   </a:solidFill>
@@ -4003,7 +4003,7 @@
             </a:ln>
             <a:extLst>
               <a:ext uri="{91240B29-F687-4f45-9708-019B960494DF}">
-                <a14:hiddenLine xmlns:a14="http://schemas.microsoft.com/office/drawing/2010/main" xmlns="" w="9525">
+                <a14:hiddenLine xmlns:a14="http://schemas.microsoft.com/office/drawing/2010/main" w="9525">
                   <a:solidFill>
                     <a:srgbClr val="000000"/>
                   </a:solidFill>
@@ -4123,7 +4123,7 @@
             </a:ln>
             <a:extLst>
               <a:ext uri="{91240B29-F687-4f45-9708-019B960494DF}">
-                <a14:hiddenLine xmlns:a14="http://schemas.microsoft.com/office/drawing/2010/main" xmlns="" w="9525">
+                <a14:hiddenLine xmlns:a14="http://schemas.microsoft.com/office/drawing/2010/main" w="9525">
                   <a:solidFill>
                     <a:srgbClr val="000000"/>
                   </a:solidFill>
@@ -4191,7 +4191,7 @@
             </a:ln>
             <a:extLst>
               <a:ext uri="{91240B29-F687-4f45-9708-019B960494DF}">
-                <a14:hiddenLine xmlns:a14="http://schemas.microsoft.com/office/drawing/2010/main" xmlns="" w="9525">
+                <a14:hiddenLine xmlns:a14="http://schemas.microsoft.com/office/drawing/2010/main" w="9525">
                   <a:solidFill>
                     <a:srgbClr val="000000"/>
                   </a:solidFill>
@@ -4281,7 +4281,7 @@
             </a:ln>
             <a:extLst>
               <a:ext uri="{91240B29-F687-4f45-9708-019B960494DF}">
-                <a14:hiddenLine xmlns:a14="http://schemas.microsoft.com/office/drawing/2010/main" xmlns="" w="9525">
+                <a14:hiddenLine xmlns:a14="http://schemas.microsoft.com/office/drawing/2010/main" w="9525">
                   <a:solidFill>
                     <a:srgbClr val="000000"/>
                   </a:solidFill>
@@ -4421,7 +4421,7 @@
           <a:p>
             <a:fld id="{B3D6EF8A-A6D9-B040-9BC2-718C5C9E1F91}" type="datetimeFigureOut">
               <a:rPr lang="en-US" smtClean="0"/>
-              <a:t>4/28/2015</a:t>
+              <a:t>4/28/15</a:t>
             </a:fld>
             <a:endParaRPr lang="en-US"/>
           </a:p>
@@ -4688,7 +4688,7 @@
           <a:p>
             <a:fld id="{B3D6EF8A-A6D9-B040-9BC2-718C5C9E1F91}" type="datetimeFigureOut">
               <a:rPr lang="en-US" smtClean="0"/>
-              <a:t>4/28/2015</a:t>
+              <a:t>4/28/15</a:t>
             </a:fld>
             <a:endParaRPr lang="en-US"/>
           </a:p>
@@ -4884,7 +4884,7 @@
           <a:p>
             <a:fld id="{B3D6EF8A-A6D9-B040-9BC2-718C5C9E1F91}" type="datetimeFigureOut">
               <a:rPr lang="en-US" smtClean="0"/>
-              <a:t>4/28/2015</a:t>
+              <a:t>4/28/15</a:t>
             </a:fld>
             <a:endParaRPr lang="en-US"/>
           </a:p>
@@ -5147,7 +5147,7 @@
           <a:p>
             <a:fld id="{B3D6EF8A-A6D9-B040-9BC2-718C5C9E1F91}" type="datetimeFigureOut">
               <a:rPr lang="en-US" smtClean="0"/>
-              <a:t>4/28/2015</a:t>
+              <a:t>4/28/15</a:t>
             </a:fld>
             <a:endParaRPr lang="en-US"/>
           </a:p>
@@ -5581,7 +5581,7 @@
           <a:p>
             <a:fld id="{B3D6EF8A-A6D9-B040-9BC2-718C5C9E1F91}" type="datetimeFigureOut">
               <a:rPr lang="en-US" smtClean="0"/>
-              <a:t>4/28/2015</a:t>
+              <a:t>4/28/15</a:t>
             </a:fld>
             <a:endParaRPr lang="en-US"/>
           </a:p>
@@ -6127,7 +6127,7 @@
           <a:p>
             <a:fld id="{B3D6EF8A-A6D9-B040-9BC2-718C5C9E1F91}" type="datetimeFigureOut">
               <a:rPr lang="en-US" smtClean="0"/>
-              <a:t>4/28/2015</a:t>
+              <a:t>4/28/15</a:t>
             </a:fld>
             <a:endParaRPr lang="en-US"/>
           </a:p>
@@ -6847,7 +6847,7 @@
           <a:p>
             <a:fld id="{B3D6EF8A-A6D9-B040-9BC2-718C5C9E1F91}" type="datetimeFigureOut">
               <a:rPr lang="en-US" smtClean="0"/>
-              <a:t>4/28/2015</a:t>
+              <a:t>4/28/15</a:t>
             </a:fld>
             <a:endParaRPr lang="en-US"/>
           </a:p>
@@ -7021,7 +7021,7 @@
           <a:p>
             <a:fld id="{B3D6EF8A-A6D9-B040-9BC2-718C5C9E1F91}" type="datetimeFigureOut">
               <a:rPr lang="en-US" smtClean="0"/>
-              <a:t>4/28/2015</a:t>
+              <a:t>4/28/15</a:t>
             </a:fld>
             <a:endParaRPr lang="en-US"/>
           </a:p>
@@ -7201,7 +7201,7 @@
           <a:p>
             <a:fld id="{B3D6EF8A-A6D9-B040-9BC2-718C5C9E1F91}" type="datetimeFigureOut">
               <a:rPr lang="en-US" smtClean="0"/>
-              <a:t>4/28/2015</a:t>
+              <a:t>4/28/15</a:t>
             </a:fld>
             <a:endParaRPr lang="en-US"/>
           </a:p>
@@ -7386,7 +7386,7 @@
           <a:p>
             <a:fld id="{B3D6EF8A-A6D9-B040-9BC2-718C5C9E1F91}" type="datetimeFigureOut">
               <a:rPr lang="en-US" smtClean="0"/>
-              <a:t>4/28/2015</a:t>
+              <a:t>4/28/15</a:t>
             </a:fld>
             <a:endParaRPr lang="en-US"/>
           </a:p>
@@ -7646,7 +7646,7 @@
           <a:p>
             <a:fld id="{B3D6EF8A-A6D9-B040-9BC2-718C5C9E1F91}" type="datetimeFigureOut">
               <a:rPr lang="en-US" smtClean="0"/>
-              <a:t>4/28/2015</a:t>
+              <a:t>4/28/15</a:t>
             </a:fld>
             <a:endParaRPr lang="en-US"/>
           </a:p>
@@ -7878,7 +7878,7 @@
           <a:p>
             <a:fld id="{B3D6EF8A-A6D9-B040-9BC2-718C5C9E1F91}" type="datetimeFigureOut">
               <a:rPr lang="en-US" smtClean="0"/>
-              <a:t>4/28/2015</a:t>
+              <a:t>4/28/15</a:t>
             </a:fld>
             <a:endParaRPr lang="en-US"/>
           </a:p>
@@ -8259,7 +8259,7 @@
           <a:p>
             <a:fld id="{B3D6EF8A-A6D9-B040-9BC2-718C5C9E1F91}" type="datetimeFigureOut">
               <a:rPr lang="en-US" smtClean="0"/>
-              <a:t>4/28/2015</a:t>
+              <a:t>4/28/15</a:t>
             </a:fld>
             <a:endParaRPr lang="en-US"/>
           </a:p>
@@ -8377,7 +8377,7 @@
           <a:p>
             <a:fld id="{B3D6EF8A-A6D9-B040-9BC2-718C5C9E1F91}" type="datetimeFigureOut">
               <a:rPr lang="en-US" smtClean="0"/>
-              <a:t>4/28/2015</a:t>
+              <a:t>4/28/15</a:t>
             </a:fld>
             <a:endParaRPr lang="en-US"/>
           </a:p>
@@ -8472,7 +8472,7 @@
           <a:p>
             <a:fld id="{B3D6EF8A-A6D9-B040-9BC2-718C5C9E1F91}" type="datetimeFigureOut">
               <a:rPr lang="en-US" smtClean="0"/>
-              <a:t>4/28/2015</a:t>
+              <a:t>4/28/15</a:t>
             </a:fld>
             <a:endParaRPr lang="en-US"/>
           </a:p>
@@ -8721,7 +8721,7 @@
           <a:p>
             <a:fld id="{B3D6EF8A-A6D9-B040-9BC2-718C5C9E1F91}" type="datetimeFigureOut">
               <a:rPr lang="en-US" smtClean="0"/>
-              <a:t>4/28/2015</a:t>
+              <a:t>4/28/15</a:t>
             </a:fld>
             <a:endParaRPr lang="en-US"/>
           </a:p>
@@ -8973,7 +8973,7 @@
           <a:p>
             <a:fld id="{B3D6EF8A-A6D9-B040-9BC2-718C5C9E1F91}" type="datetimeFigureOut">
               <a:rPr lang="en-US" smtClean="0"/>
-              <a:t>4/28/2015</a:t>
+              <a:t>4/28/15</a:t>
             </a:fld>
             <a:endParaRPr lang="en-US"/>
           </a:p>
@@ -9096,7 +9096,7 @@
           <a:noFill/>
           <a:extLst>
             <a:ext uri="{909E8E84-426E-40dd-AFC4-6F175D3DCCD1}">
-              <a14:hiddenFill xmlns:a14="http://schemas.microsoft.com/office/drawing/2010/main" xmlns="">
+              <a14:hiddenFill xmlns:a14="http://schemas.microsoft.com/office/drawing/2010/main">
                 <a:solidFill>
                   <a:srgbClr val="FFFFFF"/>
                 </a:solidFill>
@@ -9170,7 +9170,7 @@
               </a:ln>
               <a:extLst>
                 <a:ext uri="{91240B29-F687-4f45-9708-019B960494DF}">
-                  <a14:hiddenLine xmlns:a14="http://schemas.microsoft.com/office/drawing/2010/main" xmlns="" w="9525">
+                  <a14:hiddenLine xmlns:a14="http://schemas.microsoft.com/office/drawing/2010/main" w="9525">
                     <a:solidFill>
                       <a:srgbClr val="000000"/>
                     </a:solidFill>
@@ -9260,7 +9260,7 @@
               </a:ln>
               <a:extLst>
                 <a:ext uri="{91240B29-F687-4f45-9708-019B960494DF}">
-                  <a14:hiddenLine xmlns:a14="http://schemas.microsoft.com/office/drawing/2010/main" xmlns="" w="9525">
+                  <a14:hiddenLine xmlns:a14="http://schemas.microsoft.com/office/drawing/2010/main" w="9525">
                     <a:solidFill>
                       <a:srgbClr val="000000"/>
                     </a:solidFill>
@@ -9350,7 +9350,7 @@
               </a:ln>
               <a:extLst>
                 <a:ext uri="{91240B29-F687-4f45-9708-019B960494DF}">
-                  <a14:hiddenLine xmlns:a14="http://schemas.microsoft.com/office/drawing/2010/main" xmlns="" w="9525">
+                  <a14:hiddenLine xmlns:a14="http://schemas.microsoft.com/office/drawing/2010/main" w="9525">
                     <a:solidFill>
                       <a:srgbClr val="000000"/>
                     </a:solidFill>
@@ -9412,7 +9412,7 @@
               </a:ln>
               <a:extLst>
                 <a:ext uri="{91240B29-F687-4f45-9708-019B960494DF}">
-                  <a14:hiddenLine xmlns:a14="http://schemas.microsoft.com/office/drawing/2010/main" xmlns="" w="9525">
+                  <a14:hiddenLine xmlns:a14="http://schemas.microsoft.com/office/drawing/2010/main" w="9525">
                     <a:solidFill>
                       <a:srgbClr val="000000"/>
                     </a:solidFill>
@@ -9502,7 +9502,7 @@
               </a:ln>
               <a:extLst>
                 <a:ext uri="{91240B29-F687-4f45-9708-019B960494DF}">
-                  <a14:hiddenLine xmlns:a14="http://schemas.microsoft.com/office/drawing/2010/main" xmlns="" w="9525">
+                  <a14:hiddenLine xmlns:a14="http://schemas.microsoft.com/office/drawing/2010/main" w="9525">
                     <a:solidFill>
                       <a:srgbClr val="000000"/>
                     </a:solidFill>
@@ -9564,7 +9564,7 @@
               </a:ln>
               <a:extLst>
                 <a:ext uri="{91240B29-F687-4f45-9708-019B960494DF}">
-                  <a14:hiddenLine xmlns:a14="http://schemas.microsoft.com/office/drawing/2010/main" xmlns="" w="9525">
+                  <a14:hiddenLine xmlns:a14="http://schemas.microsoft.com/office/drawing/2010/main" w="9525">
                     <a:solidFill>
                       <a:srgbClr val="000000"/>
                     </a:solidFill>
@@ -9626,7 +9626,7 @@
               </a:ln>
               <a:extLst>
                 <a:ext uri="{91240B29-F687-4f45-9708-019B960494DF}">
-                  <a14:hiddenLine xmlns:a14="http://schemas.microsoft.com/office/drawing/2010/main" xmlns="" w="9525">
+                  <a14:hiddenLine xmlns:a14="http://schemas.microsoft.com/office/drawing/2010/main" w="9525">
                     <a:solidFill>
                       <a:srgbClr val="000000"/>
                     </a:solidFill>
@@ -9716,7 +9716,7 @@
               </a:ln>
               <a:extLst>
                 <a:ext uri="{91240B29-F687-4f45-9708-019B960494DF}">
-                  <a14:hiddenLine xmlns:a14="http://schemas.microsoft.com/office/drawing/2010/main" xmlns="" w="9525">
+                  <a14:hiddenLine xmlns:a14="http://schemas.microsoft.com/office/drawing/2010/main" w="9525">
                     <a:solidFill>
                       <a:srgbClr val="000000"/>
                     </a:solidFill>
@@ -9806,7 +9806,7 @@
               </a:ln>
               <a:extLst>
                 <a:ext uri="{91240B29-F687-4f45-9708-019B960494DF}">
-                  <a14:hiddenLine xmlns:a14="http://schemas.microsoft.com/office/drawing/2010/main" xmlns="" w="9525">
+                  <a14:hiddenLine xmlns:a14="http://schemas.microsoft.com/office/drawing/2010/main" w="9525">
                     <a:solidFill>
                       <a:srgbClr val="000000"/>
                     </a:solidFill>
@@ -9868,7 +9868,7 @@
               </a:ln>
               <a:extLst>
                 <a:ext uri="{91240B29-F687-4f45-9708-019B960494DF}">
-                  <a14:hiddenLine xmlns:a14="http://schemas.microsoft.com/office/drawing/2010/main" xmlns="" w="9525">
+                  <a14:hiddenLine xmlns:a14="http://schemas.microsoft.com/office/drawing/2010/main" w="9525">
                     <a:solidFill>
                       <a:srgbClr val="000000"/>
                     </a:solidFill>
@@ -9978,7 +9978,7 @@
               </a:ln>
               <a:extLst>
                 <a:ext uri="{91240B29-F687-4f45-9708-019B960494DF}">
-                  <a14:hiddenLine xmlns:a14="http://schemas.microsoft.com/office/drawing/2010/main" xmlns="" w="9525">
+                  <a14:hiddenLine xmlns:a14="http://schemas.microsoft.com/office/drawing/2010/main" w="9525">
                     <a:solidFill>
                       <a:srgbClr val="000000"/>
                     </a:solidFill>
@@ -10062,7 +10062,7 @@
               </a:ln>
               <a:extLst>
                 <a:ext uri="{91240B29-F687-4f45-9708-019B960494DF}">
-                  <a14:hiddenLine xmlns:a14="http://schemas.microsoft.com/office/drawing/2010/main" xmlns="" w="9525">
+                  <a14:hiddenLine xmlns:a14="http://schemas.microsoft.com/office/drawing/2010/main" w="9525">
                     <a:solidFill>
                       <a:srgbClr val="000000"/>
                     </a:solidFill>
@@ -10124,7 +10124,7 @@
               </a:ln>
               <a:extLst>
                 <a:ext uri="{91240B29-F687-4f45-9708-019B960494DF}">
-                  <a14:hiddenLine xmlns:a14="http://schemas.microsoft.com/office/drawing/2010/main" xmlns="" w="9525">
+                  <a14:hiddenLine xmlns:a14="http://schemas.microsoft.com/office/drawing/2010/main" w="9525">
                     <a:solidFill>
                       <a:srgbClr val="000000"/>
                     </a:solidFill>
@@ -10186,7 +10186,7 @@
               </a:ln>
               <a:extLst>
                 <a:ext uri="{91240B29-F687-4f45-9708-019B960494DF}">
-                  <a14:hiddenLine xmlns:a14="http://schemas.microsoft.com/office/drawing/2010/main" xmlns="" w="9525">
+                  <a14:hiddenLine xmlns:a14="http://schemas.microsoft.com/office/drawing/2010/main" w="9525">
                     <a:solidFill>
                       <a:srgbClr val="000000"/>
                     </a:solidFill>
@@ -10276,7 +10276,7 @@
               </a:ln>
               <a:extLst>
                 <a:ext uri="{91240B29-F687-4f45-9708-019B960494DF}">
-                  <a14:hiddenLine xmlns:a14="http://schemas.microsoft.com/office/drawing/2010/main" xmlns="" w="9525">
+                  <a14:hiddenLine xmlns:a14="http://schemas.microsoft.com/office/drawing/2010/main" w="9525">
                     <a:solidFill>
                       <a:srgbClr val="000000"/>
                     </a:solidFill>
@@ -10310,7 +10310,7 @@
               </a:ln>
               <a:extLst>
                 <a:ext uri="{91240B29-F687-4f45-9708-019B960494DF}">
-                  <a14:hiddenLine xmlns:a14="http://schemas.microsoft.com/office/drawing/2010/main" xmlns="" w="9525">
+                  <a14:hiddenLine xmlns:a14="http://schemas.microsoft.com/office/drawing/2010/main" w="9525">
                     <a:solidFill>
                       <a:srgbClr val="000000"/>
                     </a:solidFill>
@@ -10375,7 +10375,7 @@
               </a:ln>
               <a:extLst>
                 <a:ext uri="{91240B29-F687-4f45-9708-019B960494DF}">
-                  <a14:hiddenLine xmlns:a14="http://schemas.microsoft.com/office/drawing/2010/main" xmlns="" w="9525">
+                  <a14:hiddenLine xmlns:a14="http://schemas.microsoft.com/office/drawing/2010/main" w="9525">
                     <a:solidFill>
                       <a:srgbClr val="000000"/>
                     </a:solidFill>
@@ -10465,7 +10465,7 @@
               </a:ln>
               <a:extLst>
                 <a:ext uri="{91240B29-F687-4f45-9708-019B960494DF}">
-                  <a14:hiddenLine xmlns:a14="http://schemas.microsoft.com/office/drawing/2010/main" xmlns="" w="9525">
+                  <a14:hiddenLine xmlns:a14="http://schemas.microsoft.com/office/drawing/2010/main" w="9525">
                     <a:solidFill>
                       <a:srgbClr val="000000"/>
                     </a:solidFill>
@@ -10527,7 +10527,7 @@
               </a:ln>
               <a:extLst>
                 <a:ext uri="{91240B29-F687-4f45-9708-019B960494DF}">
-                  <a14:hiddenLine xmlns:a14="http://schemas.microsoft.com/office/drawing/2010/main" xmlns="" w="9525">
+                  <a14:hiddenLine xmlns:a14="http://schemas.microsoft.com/office/drawing/2010/main" w="9525">
                     <a:solidFill>
                       <a:srgbClr val="000000"/>
                     </a:solidFill>
@@ -10617,7 +10617,7 @@
               </a:ln>
               <a:extLst>
                 <a:ext uri="{91240B29-F687-4f45-9708-019B960494DF}">
-                  <a14:hiddenLine xmlns:a14="http://schemas.microsoft.com/office/drawing/2010/main" xmlns="" w="9525">
+                  <a14:hiddenLine xmlns:a14="http://schemas.microsoft.com/office/drawing/2010/main" w="9525">
                     <a:solidFill>
                       <a:srgbClr val="000000"/>
                     </a:solidFill>
@@ -10682,7 +10682,7 @@
               </a:ln>
               <a:extLst>
                 <a:ext uri="{91240B29-F687-4f45-9708-019B960494DF}">
-                  <a14:hiddenLine xmlns:a14="http://schemas.microsoft.com/office/drawing/2010/main" xmlns="" w="9525">
+                  <a14:hiddenLine xmlns:a14="http://schemas.microsoft.com/office/drawing/2010/main" w="9525">
                     <a:solidFill>
                       <a:srgbClr val="000000"/>
                     </a:solidFill>
@@ -10744,7 +10744,7 @@
               </a:ln>
               <a:extLst>
                 <a:ext uri="{91240B29-F687-4f45-9708-019B960494DF}">
-                  <a14:hiddenLine xmlns:a14="http://schemas.microsoft.com/office/drawing/2010/main" xmlns="" w="9525">
+                  <a14:hiddenLine xmlns:a14="http://schemas.microsoft.com/office/drawing/2010/main" w="9525">
                     <a:solidFill>
                       <a:srgbClr val="000000"/>
                     </a:solidFill>
@@ -10834,7 +10834,7 @@
               </a:ln>
               <a:extLst>
                 <a:ext uri="{91240B29-F687-4f45-9708-019B960494DF}">
-                  <a14:hiddenLine xmlns:a14="http://schemas.microsoft.com/office/drawing/2010/main" xmlns="" w="9525">
+                  <a14:hiddenLine xmlns:a14="http://schemas.microsoft.com/office/drawing/2010/main" w="9525">
                     <a:solidFill>
                       <a:srgbClr val="000000"/>
                     </a:solidFill>
@@ -10924,7 +10924,7 @@
               </a:ln>
               <a:extLst>
                 <a:ext uri="{91240B29-F687-4f45-9708-019B960494DF}">
-                  <a14:hiddenLine xmlns:a14="http://schemas.microsoft.com/office/drawing/2010/main" xmlns="" w="9525">
+                  <a14:hiddenLine xmlns:a14="http://schemas.microsoft.com/office/drawing/2010/main" w="9525">
                     <a:solidFill>
                       <a:srgbClr val="000000"/>
                     </a:solidFill>
@@ -10989,7 +10989,7 @@
               </a:ln>
               <a:extLst>
                 <a:ext uri="{91240B29-F687-4f45-9708-019B960494DF}">
-                  <a14:hiddenLine xmlns:a14="http://schemas.microsoft.com/office/drawing/2010/main" xmlns="" w="9525">
+                  <a14:hiddenLine xmlns:a14="http://schemas.microsoft.com/office/drawing/2010/main" w="9525">
                     <a:solidFill>
                       <a:srgbClr val="000000"/>
                     </a:solidFill>
@@ -11109,7 +11109,7 @@
               </a:ln>
               <a:extLst>
                 <a:ext uri="{91240B29-F687-4f45-9708-019B960494DF}">
-                  <a14:hiddenLine xmlns:a14="http://schemas.microsoft.com/office/drawing/2010/main" xmlns="" w="9525">
+                  <a14:hiddenLine xmlns:a14="http://schemas.microsoft.com/office/drawing/2010/main" w="9525">
                     <a:solidFill>
                       <a:srgbClr val="000000"/>
                     </a:solidFill>
@@ -11207,7 +11207,7 @@
               </a:ln>
               <a:extLst>
                 <a:ext uri="{91240B29-F687-4f45-9708-019B960494DF}">
-                  <a14:hiddenLine xmlns:a14="http://schemas.microsoft.com/office/drawing/2010/main" xmlns="" w="9525">
+                  <a14:hiddenLine xmlns:a14="http://schemas.microsoft.com/office/drawing/2010/main" w="9525">
                     <a:solidFill>
                       <a:srgbClr val="000000"/>
                     </a:solidFill>
@@ -11322,7 +11322,7 @@
               </a:ln>
               <a:extLst>
                 <a:ext uri="{91240B29-F687-4f45-9708-019B960494DF}">
-                  <a14:hiddenLine xmlns:a14="http://schemas.microsoft.com/office/drawing/2010/main" xmlns="" w="9525">
+                  <a14:hiddenLine xmlns:a14="http://schemas.microsoft.com/office/drawing/2010/main" w="9525">
                     <a:solidFill>
                       <a:srgbClr val="000000"/>
                     </a:solidFill>
@@ -11412,7 +11412,7 @@
               </a:ln>
               <a:extLst>
                 <a:ext uri="{91240B29-F687-4f45-9708-019B960494DF}">
-                  <a14:hiddenLine xmlns:a14="http://schemas.microsoft.com/office/drawing/2010/main" xmlns="" w="9525">
+                  <a14:hiddenLine xmlns:a14="http://schemas.microsoft.com/office/drawing/2010/main" w="9525">
                     <a:solidFill>
                       <a:srgbClr val="000000"/>
                     </a:solidFill>
@@ -11477,7 +11477,7 @@
               </a:ln>
               <a:extLst>
                 <a:ext uri="{91240B29-F687-4f45-9708-019B960494DF}">
-                  <a14:hiddenLine xmlns:a14="http://schemas.microsoft.com/office/drawing/2010/main" xmlns="" w="9525">
+                  <a14:hiddenLine xmlns:a14="http://schemas.microsoft.com/office/drawing/2010/main" w="9525">
                     <a:solidFill>
                       <a:srgbClr val="000000"/>
                     </a:solidFill>
@@ -11567,7 +11567,7 @@
               </a:ln>
               <a:extLst>
                 <a:ext uri="{91240B29-F687-4f45-9708-019B960494DF}">
-                  <a14:hiddenLine xmlns:a14="http://schemas.microsoft.com/office/drawing/2010/main" xmlns="" w="9525">
+                  <a14:hiddenLine xmlns:a14="http://schemas.microsoft.com/office/drawing/2010/main" w="9525">
                     <a:solidFill>
                       <a:srgbClr val="000000"/>
                     </a:solidFill>
@@ -11635,7 +11635,7 @@
               </a:ln>
               <a:extLst>
                 <a:ext uri="{91240B29-F687-4f45-9708-019B960494DF}">
-                  <a14:hiddenLine xmlns:a14="http://schemas.microsoft.com/office/drawing/2010/main" xmlns="" w="9525">
+                  <a14:hiddenLine xmlns:a14="http://schemas.microsoft.com/office/drawing/2010/main" w="9525">
                     <a:solidFill>
                       <a:srgbClr val="000000"/>
                     </a:solidFill>
@@ -11725,7 +11725,7 @@
               </a:ln>
               <a:extLst>
                 <a:ext uri="{91240B29-F687-4f45-9708-019B960494DF}">
-                  <a14:hiddenLine xmlns:a14="http://schemas.microsoft.com/office/drawing/2010/main" xmlns="" w="9525">
+                  <a14:hiddenLine xmlns:a14="http://schemas.microsoft.com/office/drawing/2010/main" w="9525">
                     <a:solidFill>
                       <a:srgbClr val="000000"/>
                     </a:solidFill>
@@ -11793,7 +11793,7 @@
               </a:ln>
               <a:extLst>
                 <a:ext uri="{91240B29-F687-4f45-9708-019B960494DF}">
-                  <a14:hiddenLine xmlns:a14="http://schemas.microsoft.com/office/drawing/2010/main" xmlns="" w="9525">
+                  <a14:hiddenLine xmlns:a14="http://schemas.microsoft.com/office/drawing/2010/main" w="9525">
                     <a:solidFill>
                       <a:srgbClr val="000000"/>
                     </a:solidFill>
@@ -11883,7 +11883,7 @@
               </a:ln>
               <a:extLst>
                 <a:ext uri="{91240B29-F687-4f45-9708-019B960494DF}">
-                  <a14:hiddenLine xmlns:a14="http://schemas.microsoft.com/office/drawing/2010/main" xmlns="" w="9525">
+                  <a14:hiddenLine xmlns:a14="http://schemas.microsoft.com/office/drawing/2010/main" w="9525">
                     <a:solidFill>
                       <a:srgbClr val="000000"/>
                     </a:solidFill>
@@ -11917,7 +11917,7 @@
               </a:ln>
               <a:extLst>
                 <a:ext uri="{91240B29-F687-4f45-9708-019B960494DF}">
-                  <a14:hiddenLine xmlns:a14="http://schemas.microsoft.com/office/drawing/2010/main" xmlns="" w="9525">
+                  <a14:hiddenLine xmlns:a14="http://schemas.microsoft.com/office/drawing/2010/main" w="9525">
                     <a:solidFill>
                       <a:srgbClr val="000000"/>
                     </a:solidFill>
@@ -12057,7 +12057,7 @@
           <a:p>
             <a:fld id="{B3D6EF8A-A6D9-B040-9BC2-718C5C9E1F91}" type="datetimeFigureOut">
               <a:rPr lang="en-US" smtClean="0"/>
-              <a:t>4/28/2015</a:t>
+              <a:t>4/28/15</a:t>
             </a:fld>
             <a:endParaRPr lang="en-US"/>
           </a:p>
@@ -12555,11 +12555,7 @@
             <a:pPr algn="r"/>
             <a:r>
               <a:rPr lang="en-US" dirty="0" smtClean="0"/>
-              <a:t>Jon </a:t>
-            </a:r>
-            <a:r>
-              <a:rPr lang="en-US" dirty="0" smtClean="0"/>
-              <a:t>Whitaker</a:t>
+              <a:t>Jon Whitaker</a:t>
             </a:r>
             <a:endParaRPr lang="en-US" dirty="0"/>
           </a:p>
@@ -12578,7 +12574,7 @@
   <p:timing>
     <p:tnLst>
       <p:par>
-        <p:cTn id="1" dur="indefinite" restart="never" nodeType="tmRoot"/>
+        <p:cTn xmlns:p14="http://schemas.microsoft.com/office/powerpoint/2010/main" id="1" dur="indefinite" restart="never" nodeType="tmRoot"/>
       </p:par>
     </p:tnLst>
   </p:timing>
@@ -15972,7 +15968,7 @@
   <p:timing>
     <p:tnLst>
       <p:par>
-        <p:cTn id="1" dur="indefinite" restart="never" nodeType="tmRoot"/>
+        <p:cTn xmlns:p14="http://schemas.microsoft.com/office/powerpoint/2010/main" id="1" dur="indefinite" restart="never" nodeType="tmRoot"/>
       </p:par>
     </p:tnLst>
   </p:timing>
@@ -18490,7 +18486,7 @@
   <p:timing>
     <p:tnLst>
       <p:par>
-        <p:cTn id="1" dur="indefinite" restart="never" nodeType="tmRoot"/>
+        <p:cTn xmlns:p14="http://schemas.microsoft.com/office/powerpoint/2010/main" id="1" dur="indefinite" restart="never" nodeType="tmRoot"/>
       </p:par>
     </p:tnLst>
   </p:timing>
@@ -18562,11 +18558,213 @@
         </p:blipFill>
         <p:spPr>
           <a:xfrm>
-            <a:off x="2211426" y="2249488"/>
-            <a:ext cx="4717974" cy="3541712"/>
+            <a:off x="5460303" y="4102233"/>
+            <a:ext cx="3520243" cy="2642594"/>
           </a:xfrm>
         </p:spPr>
       </p:pic>
+      <p:sp>
+        <p:nvSpPr>
+          <p:cNvPr id="5" name="TextBox 4"/>
+          <p:cNvSpPr txBox="1"/>
+          <p:nvPr/>
+        </p:nvSpPr>
+        <p:spPr>
+          <a:xfrm>
+            <a:off x="1445941" y="1747902"/>
+            <a:ext cx="6714192" cy="4985980"/>
+          </a:xfrm>
+          <a:prstGeom prst="rect">
+            <a:avLst/>
+          </a:prstGeom>
+          <a:noFill/>
+        </p:spPr>
+        <p:txBody>
+          <a:bodyPr wrap="square" rtlCol="0">
+            <a:spAutoFit/>
+          </a:bodyPr>
+          <a:lstStyle/>
+          <a:p>
+            <a:pPr marL="285750" indent="-285750">
+              <a:buFont typeface="Arial"/>
+              <a:buChar char="•"/>
+            </a:pPr>
+            <a:r>
+              <a:rPr lang="en-US" sz="2000" dirty="0" smtClean="0"/>
+              <a:t>One arm for each face of the cube</a:t>
+            </a:r>
+          </a:p>
+          <a:p>
+            <a:pPr marL="285750" indent="-285750">
+              <a:buFont typeface="Arial"/>
+              <a:buChar char="•"/>
+            </a:pPr>
+            <a:r>
+              <a:rPr lang="en-US" sz="2000" dirty="0"/>
+              <a:t>E</a:t>
+            </a:r>
+            <a:r>
+              <a:rPr lang="en-US" sz="2000" dirty="0" smtClean="0"/>
+              <a:t>ach </a:t>
+            </a:r>
+            <a:r>
+              <a:rPr lang="en-US" sz="2000" dirty="0"/>
+              <a:t>arm must </a:t>
+            </a:r>
+            <a:r>
+              <a:rPr lang="en-US" sz="2000" dirty="0" smtClean="0"/>
+              <a:t>actuate, and avoid contact with the other arms</a:t>
+            </a:r>
+          </a:p>
+          <a:p>
+            <a:pPr marL="285750" indent="-285750">
+              <a:buFont typeface="Arial"/>
+              <a:buChar char="•"/>
+            </a:pPr>
+            <a:r>
+              <a:rPr lang="en-US" sz="2000" dirty="0"/>
+              <a:t>Very time </a:t>
+            </a:r>
+            <a:r>
+              <a:rPr lang="en-US" sz="2000" dirty="0" smtClean="0"/>
+              <a:t>critical component</a:t>
+            </a:r>
+          </a:p>
+          <a:p>
+            <a:pPr marL="285750" indent="-285750">
+              <a:buFont typeface="Arial"/>
+              <a:buChar char="•"/>
+            </a:pPr>
+            <a:r>
+              <a:rPr lang="en-US" sz="2000" dirty="0" smtClean="0"/>
+              <a:t>Initial ideas included motors</a:t>
+            </a:r>
+          </a:p>
+          <a:p>
+            <a:pPr marL="800100" lvl="1" indent="-342900">
+              <a:buFont typeface="Arial"/>
+              <a:buChar char="•"/>
+            </a:pPr>
+            <a:r>
+              <a:rPr lang="en-US" sz="2000" dirty="0" smtClean="0"/>
+              <a:t>Rotary motion to linear motion</a:t>
+            </a:r>
+          </a:p>
+          <a:p>
+            <a:pPr marL="800100" lvl="1" indent="-342900">
+              <a:buFont typeface="Arial"/>
+              <a:buChar char="•"/>
+            </a:pPr>
+            <a:r>
+              <a:rPr lang="en-US" sz="2000" dirty="0" smtClean="0"/>
+              <a:t>Linear actuator motor</a:t>
+            </a:r>
+          </a:p>
+          <a:p>
+            <a:pPr marL="342900" indent="-342900">
+              <a:buFont typeface="Arial"/>
+              <a:buChar char="•"/>
+            </a:pPr>
+            <a:r>
+              <a:rPr lang="en-US" sz="2000" dirty="0" smtClean="0"/>
+              <a:t>Solution</a:t>
+            </a:r>
+            <a:r>
+              <a:rPr lang="en-US" sz="2000" dirty="0"/>
+              <a:t>: </a:t>
+            </a:r>
+            <a:r>
+              <a:rPr lang="en-US" sz="2000" dirty="0" smtClean="0"/>
+              <a:t>double action pneumatic air cylinder</a:t>
+            </a:r>
+          </a:p>
+          <a:p>
+            <a:pPr marL="800100" lvl="1" indent="-342900">
+              <a:buFont typeface="Arial"/>
+              <a:buChar char="•"/>
+            </a:pPr>
+            <a:r>
+              <a:rPr lang="en-US" sz="2000" dirty="0" smtClean="0"/>
+              <a:t>High Speed</a:t>
+            </a:r>
+          </a:p>
+          <a:p>
+            <a:pPr marL="800100" lvl="1" indent="-342900">
+              <a:buFont typeface="Arial"/>
+              <a:buChar char="•"/>
+            </a:pPr>
+            <a:r>
+              <a:rPr lang="en-US" sz="2000" dirty="0" smtClean="0"/>
+              <a:t>Affordable</a:t>
+            </a:r>
+          </a:p>
+          <a:p>
+            <a:pPr marL="800100" lvl="1" indent="-342900">
+              <a:buFont typeface="Arial"/>
+              <a:buChar char="•"/>
+            </a:pPr>
+            <a:r>
+              <a:rPr lang="en-US" sz="2000" dirty="0" smtClean="0"/>
+              <a:t>Small footprint</a:t>
+            </a:r>
+          </a:p>
+          <a:p>
+            <a:pPr marL="342900" indent="-342900">
+              <a:buFont typeface="Arial"/>
+              <a:buChar char="•"/>
+            </a:pPr>
+            <a:r>
+              <a:rPr lang="en-US" sz="2000" dirty="0" smtClean="0"/>
+              <a:t>Controlled by solenoid valve and a </a:t>
+            </a:r>
+          </a:p>
+          <a:p>
+            <a:r>
+              <a:rPr lang="en-US" sz="2000" dirty="0"/>
+              <a:t> </a:t>
+            </a:r>
+            <a:r>
+              <a:rPr lang="en-US" sz="2000" dirty="0" smtClean="0"/>
+              <a:t>    Relay board</a:t>
+            </a:r>
+          </a:p>
+          <a:p>
+            <a:pPr marL="342900" indent="-342900">
+              <a:buFont typeface="Arial"/>
+              <a:buChar char="•"/>
+            </a:pPr>
+            <a:r>
+              <a:rPr lang="en-US" sz="2000" dirty="0" smtClean="0"/>
+              <a:t>Simultaneous coaxial pair motion</a:t>
+            </a:r>
+          </a:p>
+          <a:p>
+            <a:pPr marL="342900" indent="-342900">
+              <a:buFont typeface="Arial"/>
+              <a:buChar char="•"/>
+            </a:pPr>
+            <a:r>
+              <a:rPr lang="en-US" sz="2000" dirty="0" smtClean="0"/>
+              <a:t>Approximately 80-100psi</a:t>
+            </a:r>
+            <a:endParaRPr lang="en-US" sz="2000" dirty="0"/>
+          </a:p>
+          <a:p>
+            <a:pPr marL="285750" indent="-285750">
+              <a:buFont typeface="Arial"/>
+              <a:buChar char="•"/>
+            </a:pPr>
+            <a:endParaRPr lang="en-US" sz="2000" dirty="0" smtClean="0"/>
+          </a:p>
+          <a:p>
+            <a:pPr marL="285750" indent="-285750">
+              <a:buFont typeface="Arial"/>
+              <a:buChar char="•"/>
+            </a:pPr>
+            <a:endParaRPr lang="en-US" dirty="0"/>
+          </a:p>
+        </p:txBody>
+      </p:sp>
     </p:spTree>
     <p:extLst>
       <p:ext uri="{BB962C8B-B14F-4D97-AF65-F5344CB8AC3E}">
@@ -18580,7 +18778,7 @@
   <p:timing>
     <p:tnLst>
       <p:par>
-        <p:cTn id="1" dur="indefinite" restart="never" nodeType="tmRoot"/>
+        <p:cTn xmlns:p14="http://schemas.microsoft.com/office/powerpoint/2010/main" id="1" dur="indefinite" restart="never" nodeType="tmRoot"/>
       </p:par>
     </p:tnLst>
   </p:timing>
@@ -18654,11 +18852,134 @@
         </p:blipFill>
         <p:spPr>
           <a:xfrm>
-            <a:off x="2205694" y="2249488"/>
-            <a:ext cx="4729437" cy="3541712"/>
+            <a:off x="5104798" y="4075705"/>
+            <a:ext cx="3180760" cy="2381961"/>
           </a:xfrm>
         </p:spPr>
       </p:pic>
+      <p:sp>
+        <p:nvSpPr>
+          <p:cNvPr id="6" name="TextBox 5"/>
+          <p:cNvSpPr txBox="1"/>
+          <p:nvPr/>
+        </p:nvSpPr>
+        <p:spPr>
+          <a:xfrm>
+            <a:off x="856060" y="2364069"/>
+            <a:ext cx="7115471" cy="3785652"/>
+          </a:xfrm>
+          <a:prstGeom prst="rect">
+            <a:avLst/>
+          </a:prstGeom>
+          <a:noFill/>
+        </p:spPr>
+        <p:txBody>
+          <a:bodyPr wrap="square" rtlCol="0">
+            <a:spAutoFit/>
+          </a:bodyPr>
+          <a:lstStyle/>
+          <a:p>
+            <a:pPr marL="342900" indent="-342900">
+              <a:buFont typeface="Arial"/>
+              <a:buChar char="•"/>
+            </a:pPr>
+            <a:r>
+              <a:rPr lang="en-US" sz="2000" dirty="0"/>
+              <a:t>Each actuating arm will have a stepper </a:t>
+            </a:r>
+            <a:r>
+              <a:rPr lang="en-US" sz="2000" dirty="0" smtClean="0"/>
+              <a:t>motor to control rotating each face of the cube</a:t>
+            </a:r>
+          </a:p>
+          <a:p>
+            <a:pPr marL="342900" indent="-342900">
+              <a:buFont typeface="Arial"/>
+              <a:buChar char="•"/>
+            </a:pPr>
+            <a:r>
+              <a:rPr lang="en-US" sz="2000" dirty="0" smtClean="0"/>
+              <a:t>90 degree or 180 degree rotations</a:t>
+            </a:r>
+          </a:p>
+          <a:p>
+            <a:pPr marL="342900" indent="-342900">
+              <a:buFont typeface="Arial"/>
+              <a:buChar char="•"/>
+            </a:pPr>
+            <a:r>
+              <a:rPr lang="en-US" sz="2000" dirty="0" smtClean="0"/>
+              <a:t>Clockwise or Counter-Clockwise rotations</a:t>
+            </a:r>
+          </a:p>
+          <a:p>
+            <a:pPr marL="342900" indent="-342900">
+              <a:buFont typeface="Arial"/>
+              <a:buChar char="•"/>
+            </a:pPr>
+            <a:r>
+              <a:rPr lang="en-US" sz="2000" dirty="0" smtClean="0"/>
+              <a:t>Controlled by a FPGA and Motor control board, which contains a motor driver chip for each stepper</a:t>
+            </a:r>
+          </a:p>
+          <a:p>
+            <a:pPr marL="342900" indent="-342900">
+              <a:buFont typeface="Arial"/>
+              <a:buChar char="•"/>
+            </a:pPr>
+            <a:r>
+              <a:rPr lang="en-US" sz="2000" dirty="0" smtClean="0"/>
+              <a:t>Full Steps, no micro-stepping</a:t>
+            </a:r>
+          </a:p>
+          <a:p>
+            <a:pPr marL="342900" indent="-342900">
+              <a:buFont typeface="Arial"/>
+              <a:buChar char="•"/>
+            </a:pPr>
+            <a:r>
+              <a:rPr lang="en-US" sz="2000" dirty="0" smtClean="0"/>
+              <a:t>Break Sensor for 90 degree </a:t>
+            </a:r>
+          </a:p>
+          <a:p>
+            <a:r>
+              <a:rPr lang="en-US" sz="2000" dirty="0"/>
+              <a:t> </a:t>
+            </a:r>
+            <a:r>
+              <a:rPr lang="en-US" sz="2000" dirty="0" smtClean="0"/>
+              <a:t>   </a:t>
+            </a:r>
+            <a:r>
+              <a:rPr lang="en-US" sz="2000" smtClean="0"/>
+              <a:t> alignment.</a:t>
+            </a:r>
+            <a:endParaRPr lang="en-US" sz="2000" dirty="0" smtClean="0"/>
+          </a:p>
+          <a:p>
+            <a:pPr marL="342900" indent="-342900">
+              <a:buFont typeface="Arial"/>
+              <a:buChar char="•"/>
+            </a:pPr>
+            <a:endParaRPr lang="en-US" sz="2000" dirty="0" smtClean="0"/>
+          </a:p>
+          <a:p>
+            <a:pPr marL="342900" indent="-342900">
+              <a:buFont typeface="Arial"/>
+              <a:buChar char="•"/>
+            </a:pPr>
+            <a:endParaRPr lang="en-US" sz="2000" dirty="0" smtClean="0"/>
+          </a:p>
+          <a:p>
+            <a:pPr marL="342900" indent="-342900">
+              <a:buFont typeface="Arial"/>
+              <a:buChar char="•"/>
+            </a:pPr>
+            <a:endParaRPr lang="en-US" sz="2000" dirty="0"/>
+          </a:p>
+        </p:txBody>
+      </p:sp>
     </p:spTree>
     <p:extLst>
       <p:ext uri="{BB962C8B-B14F-4D97-AF65-F5344CB8AC3E}">
@@ -18672,7 +18993,7 @@
   <p:timing>
     <p:tnLst>
       <p:par>
-        <p:cTn id="1" dur="indefinite" restart="never" nodeType="tmRoot"/>
+        <p:cTn xmlns:p14="http://schemas.microsoft.com/office/powerpoint/2010/main" id="1" dur="indefinite" restart="never" nodeType="tmRoot"/>
       </p:par>
     </p:tnLst>
   </p:timing>
@@ -18812,7 +19133,7 @@
   <p:timing>
     <p:tnLst>
       <p:par>
-        <p:cTn id="1" dur="indefinite" restart="never" nodeType="tmRoot"/>
+        <p:cTn xmlns:p14="http://schemas.microsoft.com/office/powerpoint/2010/main" id="1" dur="indefinite" restart="never" nodeType="tmRoot"/>
       </p:par>
     </p:tnLst>
   </p:timing>
@@ -18917,11 +19238,7 @@
             </a:r>
             <a:r>
               <a:rPr lang="en-US" dirty="0" smtClean="0"/>
-              <a:t> </a:t>
-            </a:r>
-            <a:r>
-              <a:rPr lang="en-US" dirty="0" smtClean="0"/>
-              <a:t>Industries</a:t>
+              <a:t> Industries</a:t>
             </a:r>
             <a:endParaRPr lang="en-US" dirty="0"/>
           </a:p>
@@ -19031,7 +19348,7 @@
   <p:timing>
     <p:tnLst>
       <p:par>
-        <p:cTn id="1" dur="indefinite" restart="never" nodeType="tmRoot"/>
+        <p:cTn xmlns:p14="http://schemas.microsoft.com/office/powerpoint/2010/main" id="1" dur="indefinite" restart="never" nodeType="tmRoot"/>
       </p:par>
     </p:tnLst>
   </p:timing>
@@ -19326,7 +19643,7 @@
   <p:timing>
     <p:tnLst>
       <p:par>
-        <p:cTn id="1" dur="indefinite" restart="never" nodeType="tmRoot"/>
+        <p:cTn xmlns:p14="http://schemas.microsoft.com/office/powerpoint/2010/main" id="1" dur="indefinite" restart="never" nodeType="tmRoot"/>
       </p:par>
     </p:tnLst>
   </p:timing>
@@ -19395,11 +19712,7 @@
             </a:r>
             <a:r>
               <a:rPr lang="en-US" dirty="0" smtClean="0"/>
-              <a:t> 3 – Fastest robot to solv</a:t>
-            </a:r>
-            <a:r>
-              <a:rPr lang="en-US" dirty="0" smtClean="0"/>
-              <a:t>e a Rubik’s Cube (3.253s) [1].</a:t>
+              <a:t> 3 – Fastest robot to solve a Rubik’s Cube (3.253s) [1].</a:t>
             </a:r>
           </a:p>
           <a:p>
@@ -19417,7 +19730,7 @@
             <a:picLocks noRot="1" noChangeAspect="1"/>
           </p:cNvPicPr>
           <p:nvPr>
-            <a:videoFile r:link="rId1"/>
+            <a:quickTimeFile r:link="rId1"/>
           </p:nvPr>
         </p:nvPicPr>
         <p:blipFill>
@@ -19449,7 +19762,7 @@
   <p:timing>
     <p:tnLst>
       <p:par>
-        <p:cTn id="1" dur="indefinite" restart="never" nodeType="tmRoot"/>
+        <p:cTn xmlns:p14="http://schemas.microsoft.com/office/powerpoint/2010/main" id="1" dur="indefinite" restart="never" nodeType="tmRoot"/>
       </p:par>
     </p:tnLst>
   </p:timing>
@@ -19542,11 +19855,7 @@
             <a:pPr lvl="1"/>
             <a:r>
               <a:rPr lang="en-US" dirty="0" smtClean="0"/>
-              <a:t>Video cameras, stepper motors, mechanical actuators, singl</a:t>
-            </a:r>
-            <a:r>
-              <a:rPr lang="en-US" dirty="0" smtClean="0"/>
-              <a:t>e-board computer, FPGA</a:t>
+              <a:t>Video cameras, stepper motors, mechanical actuators, single-board computer, FPGA</a:t>
             </a:r>
             <a:endParaRPr lang="en-US" dirty="0"/>
           </a:p>
@@ -19573,7 +19882,6 @@
               <a:rPr lang="en-US" dirty="0"/>
               <a:t>the precision needed to rotate the cube.</a:t>
             </a:r>
-            <a:endParaRPr lang="en-US" dirty="0"/>
           </a:p>
         </p:txBody>
       </p:sp>
@@ -19590,7 +19898,7 @@
   <p:timing>
     <p:tnLst>
       <p:par>
-        <p:cTn id="1" dur="indefinite" restart="never" nodeType="tmRoot"/>
+        <p:cTn xmlns:p14="http://schemas.microsoft.com/office/powerpoint/2010/main" id="1" dur="indefinite" restart="never" nodeType="tmRoot"/>
       </p:par>
     </p:tnLst>
   </p:timing>
@@ -19976,7 +20284,7 @@
   <p:timing>
     <p:tnLst>
       <p:par>
-        <p:cTn id="1" dur="indefinite" restart="never" nodeType="tmRoot"/>
+        <p:cTn xmlns:p14="http://schemas.microsoft.com/office/powerpoint/2010/main" id="1" dur="indefinite" restart="never" nodeType="tmRoot"/>
       </p:par>
     </p:tnLst>
   </p:timing>
@@ -20123,15 +20431,7 @@
             </a:r>
             <a:r>
               <a:rPr lang="en-US" sz="1600" dirty="0" smtClean="0"/>
-              <a:t> </a:t>
-            </a:r>
-            <a:r>
-              <a:rPr lang="en-US" sz="1600" dirty="0" smtClean="0"/>
-              <a:t>Determine </a:t>
-            </a:r>
-            <a:r>
-              <a:rPr lang="en-US" sz="1600" dirty="0" smtClean="0"/>
-              <a:t>Face Color </a:t>
+              <a:t> Determine Face Color </a:t>
             </a:r>
           </a:p>
           <a:p>
@@ -20204,11 +20504,7 @@
             <a:pPr algn="ctr"/>
             <a:r>
               <a:rPr lang="en-US" sz="1600" dirty="0" smtClean="0"/>
-              <a:t>12 </a:t>
-            </a:r>
-            <a:r>
-              <a:rPr lang="en-US" sz="1600" dirty="0" smtClean="0"/>
-              <a:t>Edge </a:t>
+              <a:t>12 Edge </a:t>
             </a:r>
             <a:r>
               <a:rPr lang="en-US" sz="1600" dirty="0" err="1" smtClean="0"/>
@@ -20231,7 +20527,7 @@
   <p:timing>
     <p:tnLst>
       <p:par>
-        <p:cTn id="1" dur="indefinite" restart="never" nodeType="tmRoot"/>
+        <p:cTn xmlns:p14="http://schemas.microsoft.com/office/powerpoint/2010/main" id="1" dur="indefinite" restart="never" nodeType="tmRoot"/>
       </p:par>
     </p:tnLst>
   </p:timing>
@@ -20907,7 +21203,7 @@
   <p:timing>
     <p:tnLst>
       <p:par>
-        <p:cTn id="1" dur="indefinite" restart="never" nodeType="tmRoot"/>
+        <p:cTn xmlns:p14="http://schemas.microsoft.com/office/powerpoint/2010/main" id="1" dur="indefinite" restart="never" nodeType="tmRoot"/>
       </p:par>
     </p:tnLst>
   </p:timing>
@@ -21003,7 +21299,7 @@
   <p:timing>
     <p:tnLst>
       <p:par>
-        <p:cTn id="1" dur="indefinite" restart="never" nodeType="tmRoot"/>
+        <p:cTn xmlns:p14="http://schemas.microsoft.com/office/powerpoint/2010/main" id="1" dur="indefinite" restart="never" nodeType="tmRoot"/>
       </p:par>
     </p:tnLst>
   </p:timing>
@@ -21128,11 +21424,7 @@
           <a:p>
             <a:r>
               <a:rPr lang="en-US" dirty="0" smtClean="0"/>
-              <a:t>Contour filtering - </a:t>
-            </a:r>
-            <a:r>
-              <a:rPr lang="en-US" dirty="0" smtClean="0"/>
-              <a:t>Identify </a:t>
+              <a:t>Contour filtering - Identify </a:t>
             </a:r>
             <a:r>
               <a:rPr lang="en-US" dirty="0" err="1" smtClean="0"/>
@@ -21167,7 +21459,7 @@
   <p:timing>
     <p:tnLst>
       <p:par>
-        <p:cTn id="1" dur="indefinite" restart="never" nodeType="tmRoot"/>
+        <p:cTn xmlns:p14="http://schemas.microsoft.com/office/powerpoint/2010/main" id="1" dur="indefinite" restart="never" nodeType="tmRoot"/>
       </p:par>
     </p:tnLst>
   </p:timing>
@@ -21243,11 +21535,7 @@
             </a:r>
             <a:r>
               <a:rPr lang="en-US" dirty="0" smtClean="0"/>
-              <a:t> </a:t>
-            </a:r>
-            <a:r>
-              <a:rPr lang="en-US" dirty="0" smtClean="0"/>
-              <a:t>&amp; Solution Sequence</a:t>
+              <a:t> &amp; Solution Sequence</a:t>
             </a:r>
             <a:endParaRPr lang="en-US" dirty="0"/>
           </a:p>
@@ -21407,7 +21695,7 @@
   <p:timing>
     <p:tnLst>
       <p:par>
-        <p:cTn id="1" dur="indefinite" restart="never" nodeType="tmRoot"/>
+        <p:cTn xmlns:p14="http://schemas.microsoft.com/office/powerpoint/2010/main" id="1" dur="indefinite" restart="never" nodeType="tmRoot"/>
       </p:par>
     </p:tnLst>
   </p:timing>
@@ -21457,7 +21745,7 @@
     </a:clrScheme>
     <a:fontScheme name="Circuit">
       <a:majorFont>
-        <a:latin typeface="Tw Cen MT" panose="020B0602020104020603"/>
+        <a:latin typeface="Tw Cen MT"/>
         <a:ea typeface=""/>
         <a:cs typeface=""/>
         <a:font script="Jpan" typeface="ＭＳ Ｐゴシック"/>
@@ -21492,7 +21780,7 @@
         <a:font script="Geor" typeface="Sylfaen"/>
       </a:majorFont>
       <a:minorFont>
-        <a:latin typeface="Tw Cen MT" panose="020B0602020104020603"/>
+        <a:latin typeface="Tw Cen MT"/>
         <a:ea typeface=""/>
         <a:cs typeface=""/>
         <a:font script="Jpan" typeface="ＭＳ Ｐゴシック"/>
@@ -21659,7 +21947,7 @@
   <a:extraClrSchemeLst/>
   <a:extLst>
     <a:ext uri="{05A4C25C-085E-4340-85A3-A5531E510DB2}">
-      <thm15:themeFamily xmlns:thm15="http://schemas.microsoft.com/office/thememl/2012/main" name="Circuit" id="{0AC2F7E7-15F5-431C-B2A2-456FE929F56C}" vid="{0911B802-464C-4241-8DD9-B60FF88E379F}"/>
+      <thm15:themeFamily xmlns:thm15="http://schemas.microsoft.com/office/thememl/2012/main" xmlns="" name="Circuit" id="{0AC2F7E7-15F5-431C-B2A2-456FE929F56C}" vid="{0911B802-464C-4241-8DD9-B60FF88E379F}"/>
     </a:ext>
   </a:extLst>
 </a:theme>

</xml_diff>

<commit_message>
Fixed document formatting and added presentation files.
</commit_message>
<xml_diff>
--- a/Documents/Presentations/HerbertPresentation.pptx
+++ b/Documents/Presentations/HerbertPresentation.pptx
@@ -121,7 +121,7 @@
   </p:defaultTextStyle>
   <p:extLst>
     <p:ext uri="{EFAFB233-063F-42B5-8137-9DF3F51BA10A}">
-      <p15:sldGuideLst xmlns="" xmlns:p15="http://schemas.microsoft.com/office/powerpoint/2012/main">
+      <p15:sldGuideLst xmlns:p15="http://schemas.microsoft.com/office/powerpoint/2012/main" xmlns="">
         <p15:guide id="1" orient="horz" pos="2160">
           <p15:clr>
             <a:srgbClr val="A4A3A4"/>
@@ -4421,7 +4421,7 @@
           <a:p>
             <a:fld id="{B3D6EF8A-A6D9-B040-9BC2-718C5C9E1F91}" type="datetimeFigureOut">
               <a:rPr lang="en-US" smtClean="0"/>
-              <a:t>4/28/15</a:t>
+              <a:t>4/29/15</a:t>
             </a:fld>
             <a:endParaRPr lang="en-US"/>
           </a:p>
@@ -4688,7 +4688,7 @@
           <a:p>
             <a:fld id="{B3D6EF8A-A6D9-B040-9BC2-718C5C9E1F91}" type="datetimeFigureOut">
               <a:rPr lang="en-US" smtClean="0"/>
-              <a:t>4/28/15</a:t>
+              <a:t>4/29/15</a:t>
             </a:fld>
             <a:endParaRPr lang="en-US"/>
           </a:p>
@@ -4884,7 +4884,7 @@
           <a:p>
             <a:fld id="{B3D6EF8A-A6D9-B040-9BC2-718C5C9E1F91}" type="datetimeFigureOut">
               <a:rPr lang="en-US" smtClean="0"/>
-              <a:t>4/28/15</a:t>
+              <a:t>4/29/15</a:t>
             </a:fld>
             <a:endParaRPr lang="en-US"/>
           </a:p>
@@ -5147,7 +5147,7 @@
           <a:p>
             <a:fld id="{B3D6EF8A-A6D9-B040-9BC2-718C5C9E1F91}" type="datetimeFigureOut">
               <a:rPr lang="en-US" smtClean="0"/>
-              <a:t>4/28/15</a:t>
+              <a:t>4/29/15</a:t>
             </a:fld>
             <a:endParaRPr lang="en-US"/>
           </a:p>
@@ -5581,7 +5581,7 @@
           <a:p>
             <a:fld id="{B3D6EF8A-A6D9-B040-9BC2-718C5C9E1F91}" type="datetimeFigureOut">
               <a:rPr lang="en-US" smtClean="0"/>
-              <a:t>4/28/15</a:t>
+              <a:t>4/29/15</a:t>
             </a:fld>
             <a:endParaRPr lang="en-US"/>
           </a:p>
@@ -6127,7 +6127,7 @@
           <a:p>
             <a:fld id="{B3D6EF8A-A6D9-B040-9BC2-718C5C9E1F91}" type="datetimeFigureOut">
               <a:rPr lang="en-US" smtClean="0"/>
-              <a:t>4/28/15</a:t>
+              <a:t>4/29/15</a:t>
             </a:fld>
             <a:endParaRPr lang="en-US"/>
           </a:p>
@@ -6847,7 +6847,7 @@
           <a:p>
             <a:fld id="{B3D6EF8A-A6D9-B040-9BC2-718C5C9E1F91}" type="datetimeFigureOut">
               <a:rPr lang="en-US" smtClean="0"/>
-              <a:t>4/28/15</a:t>
+              <a:t>4/29/15</a:t>
             </a:fld>
             <a:endParaRPr lang="en-US"/>
           </a:p>
@@ -7021,7 +7021,7 @@
           <a:p>
             <a:fld id="{B3D6EF8A-A6D9-B040-9BC2-718C5C9E1F91}" type="datetimeFigureOut">
               <a:rPr lang="en-US" smtClean="0"/>
-              <a:t>4/28/15</a:t>
+              <a:t>4/29/15</a:t>
             </a:fld>
             <a:endParaRPr lang="en-US"/>
           </a:p>
@@ -7201,7 +7201,7 @@
           <a:p>
             <a:fld id="{B3D6EF8A-A6D9-B040-9BC2-718C5C9E1F91}" type="datetimeFigureOut">
               <a:rPr lang="en-US" smtClean="0"/>
-              <a:t>4/28/15</a:t>
+              <a:t>4/29/15</a:t>
             </a:fld>
             <a:endParaRPr lang="en-US"/>
           </a:p>
@@ -7386,7 +7386,7 @@
           <a:p>
             <a:fld id="{B3D6EF8A-A6D9-B040-9BC2-718C5C9E1F91}" type="datetimeFigureOut">
               <a:rPr lang="en-US" smtClean="0"/>
-              <a:t>4/28/15</a:t>
+              <a:t>4/29/15</a:t>
             </a:fld>
             <a:endParaRPr lang="en-US"/>
           </a:p>
@@ -7646,7 +7646,7 @@
           <a:p>
             <a:fld id="{B3D6EF8A-A6D9-B040-9BC2-718C5C9E1F91}" type="datetimeFigureOut">
               <a:rPr lang="en-US" smtClean="0"/>
-              <a:t>4/28/15</a:t>
+              <a:t>4/29/15</a:t>
             </a:fld>
             <a:endParaRPr lang="en-US"/>
           </a:p>
@@ -7878,7 +7878,7 @@
           <a:p>
             <a:fld id="{B3D6EF8A-A6D9-B040-9BC2-718C5C9E1F91}" type="datetimeFigureOut">
               <a:rPr lang="en-US" smtClean="0"/>
-              <a:t>4/28/15</a:t>
+              <a:t>4/29/15</a:t>
             </a:fld>
             <a:endParaRPr lang="en-US"/>
           </a:p>
@@ -8259,7 +8259,7 @@
           <a:p>
             <a:fld id="{B3D6EF8A-A6D9-B040-9BC2-718C5C9E1F91}" type="datetimeFigureOut">
               <a:rPr lang="en-US" smtClean="0"/>
-              <a:t>4/28/15</a:t>
+              <a:t>4/29/15</a:t>
             </a:fld>
             <a:endParaRPr lang="en-US"/>
           </a:p>
@@ -8377,7 +8377,7 @@
           <a:p>
             <a:fld id="{B3D6EF8A-A6D9-B040-9BC2-718C5C9E1F91}" type="datetimeFigureOut">
               <a:rPr lang="en-US" smtClean="0"/>
-              <a:t>4/28/15</a:t>
+              <a:t>4/29/15</a:t>
             </a:fld>
             <a:endParaRPr lang="en-US"/>
           </a:p>
@@ -8472,7 +8472,7 @@
           <a:p>
             <a:fld id="{B3D6EF8A-A6D9-B040-9BC2-718C5C9E1F91}" type="datetimeFigureOut">
               <a:rPr lang="en-US" smtClean="0"/>
-              <a:t>4/28/15</a:t>
+              <a:t>4/29/15</a:t>
             </a:fld>
             <a:endParaRPr lang="en-US"/>
           </a:p>
@@ -8721,7 +8721,7 @@
           <a:p>
             <a:fld id="{B3D6EF8A-A6D9-B040-9BC2-718C5C9E1F91}" type="datetimeFigureOut">
               <a:rPr lang="en-US" smtClean="0"/>
-              <a:t>4/28/15</a:t>
+              <a:t>4/29/15</a:t>
             </a:fld>
             <a:endParaRPr lang="en-US"/>
           </a:p>
@@ -8973,7 +8973,7 @@
           <a:p>
             <a:fld id="{B3D6EF8A-A6D9-B040-9BC2-718C5C9E1F91}" type="datetimeFigureOut">
               <a:rPr lang="en-US" smtClean="0"/>
-              <a:t>4/28/15</a:t>
+              <a:t>4/29/15</a:t>
             </a:fld>
             <a:endParaRPr lang="en-US"/>
           </a:p>
@@ -12057,7 +12057,7 @@
           <a:p>
             <a:fld id="{B3D6EF8A-A6D9-B040-9BC2-718C5C9E1F91}" type="datetimeFigureOut">
               <a:rPr lang="en-US" smtClean="0"/>
-              <a:t>4/28/15</a:t>
+              <a:t>4/29/15</a:t>
             </a:fld>
             <a:endParaRPr lang="en-US"/>
           </a:p>
@@ -13089,11 +13089,6 @@
               </a:rPr>
               <a:t>L’</a:t>
             </a:r>
-            <a:endParaRPr lang="en-US" b="1" dirty="0">
-              <a:solidFill>
-                <a:srgbClr val="0070C0"/>
-              </a:solidFill>
-            </a:endParaRPr>
           </a:p>
         </p:txBody>
       </p:sp>
@@ -13317,11 +13312,6 @@
               </a:rPr>
               <a:t>L2</a:t>
             </a:r>
-            <a:endParaRPr lang="en-US" b="1" dirty="0">
-              <a:solidFill>
-                <a:srgbClr val="0070C0"/>
-              </a:solidFill>
-            </a:endParaRPr>
           </a:p>
         </p:txBody>
       </p:sp>
@@ -13355,11 +13345,6 @@
               </a:rPr>
               <a:t>D2</a:t>
             </a:r>
-            <a:endParaRPr lang="en-US" b="1" dirty="0">
-              <a:solidFill>
-                <a:srgbClr val="FF0000"/>
-              </a:solidFill>
-            </a:endParaRPr>
           </a:p>
         </p:txBody>
       </p:sp>
@@ -14378,11 +14363,6 @@
               </a:rPr>
               <a:t>D2</a:t>
             </a:r>
-            <a:endParaRPr lang="en-US" b="1" dirty="0">
-              <a:solidFill>
-                <a:srgbClr val="FF0000"/>
-              </a:solidFill>
-            </a:endParaRPr>
           </a:p>
         </p:txBody>
       </p:sp>
@@ -15296,11 +15276,6 @@
               </a:rPr>
               <a:t>U</a:t>
             </a:r>
-            <a:endParaRPr lang="en-US" b="1" dirty="0">
-              <a:solidFill>
-                <a:srgbClr val="FFC000"/>
-              </a:solidFill>
-            </a:endParaRPr>
           </a:p>
         </p:txBody>
       </p:sp>
@@ -15438,11 +15413,6 @@
               </a:rPr>
               <a:t>L2</a:t>
             </a:r>
-            <a:endParaRPr lang="en-US" b="1" dirty="0">
-              <a:solidFill>
-                <a:srgbClr val="0070C0"/>
-              </a:solidFill>
-            </a:endParaRPr>
           </a:p>
         </p:txBody>
       </p:sp>
@@ -15476,11 +15446,6 @@
               </a:rPr>
               <a:t>U2</a:t>
             </a:r>
-            <a:endParaRPr lang="en-US" b="1" dirty="0">
-              <a:solidFill>
-                <a:srgbClr val="FFC000"/>
-              </a:solidFill>
-            </a:endParaRPr>
           </a:p>
         </p:txBody>
       </p:sp>
@@ -15514,11 +15479,6 @@
               </a:rPr>
               <a:t>B2</a:t>
             </a:r>
-            <a:endParaRPr lang="en-US" b="1" dirty="0">
-              <a:solidFill>
-                <a:schemeClr val="bg1"/>
-              </a:solidFill>
-            </a:endParaRPr>
           </a:p>
         </p:txBody>
       </p:sp>
@@ -15585,11 +15545,6 @@
               </a:rPr>
               <a:t>L’</a:t>
             </a:r>
-            <a:endParaRPr lang="en-US" b="1" dirty="0">
-              <a:solidFill>
-                <a:srgbClr val="0070C0"/>
-              </a:solidFill>
-            </a:endParaRPr>
           </a:p>
         </p:txBody>
       </p:sp>
@@ -18343,11 +18298,7 @@
             </a:pPr>
             <a:r>
               <a:rPr lang="en-US" sz="2000" dirty="0" smtClean="0"/>
-              <a:t>One arm for each </a:t>
-            </a:r>
-            <a:r>
-              <a:rPr lang="en-US" sz="2000" dirty="0" smtClean="0"/>
-              <a:t>face</a:t>
+              <a:t>One arm for each face</a:t>
             </a:r>
           </a:p>
           <a:p>
@@ -18365,15 +18316,7 @@
             </a:r>
             <a:r>
               <a:rPr lang="en-US" sz="2000" dirty="0" smtClean="0"/>
-              <a:t>actuate, </a:t>
-            </a:r>
-            <a:r>
-              <a:rPr lang="en-US" sz="2000" dirty="0" smtClean="0"/>
-              <a:t>avoiding </a:t>
-            </a:r>
-            <a:r>
-              <a:rPr lang="en-US" sz="2000" dirty="0" smtClean="0"/>
-              <a:t>contact with the other arms</a:t>
+              <a:t>actuate, avoiding contact with the other arms</a:t>
             </a:r>
           </a:p>
           <a:p>
@@ -18385,7 +18328,6 @@
               <a:rPr lang="en-US" sz="2000" dirty="0" smtClean="0"/>
               <a:t>Initial design ideas:</a:t>
             </a:r>
-            <a:endParaRPr lang="en-US" sz="2000" dirty="0" smtClean="0"/>
           </a:p>
           <a:p>
             <a:pPr marL="800100" lvl="1" indent="-342900">
@@ -18422,11 +18364,7 @@
             </a:r>
             <a:r>
               <a:rPr lang="en-US" sz="2000" dirty="0" smtClean="0"/>
-              <a:t>Double </a:t>
-            </a:r>
-            <a:r>
-              <a:rPr lang="en-US" sz="2000" dirty="0" smtClean="0"/>
-              <a:t>action pneumatic air cylinder</a:t>
+              <a:t>Double action pneumatic air cylinder</a:t>
             </a:r>
           </a:p>
           <a:p>
@@ -18466,13 +18404,8 @@
             </a:pPr>
             <a:r>
               <a:rPr lang="en-US" sz="2000" dirty="0" smtClean="0"/>
-              <a:t>Controlled by solenoid valve </a:t>
-            </a:r>
-            <a:r>
-              <a:rPr lang="en-US" sz="2000" dirty="0" smtClean="0"/>
-              <a:t>and a</a:t>
-            </a:r>
-            <a:endParaRPr lang="en-US" sz="2000" dirty="0" smtClean="0"/>
+              <a:t>Controlled by solenoid valve and a</a:t>
+            </a:r>
           </a:p>
           <a:p>
             <a:r>
@@ -18481,15 +18414,7 @@
             </a:r>
             <a:r>
               <a:rPr lang="en-US" sz="2000" dirty="0" smtClean="0"/>
-              <a:t>    </a:t>
-            </a:r>
-            <a:r>
-              <a:rPr lang="en-US" sz="2000" dirty="0" smtClean="0"/>
-              <a:t>relay </a:t>
-            </a:r>
-            <a:r>
-              <a:rPr lang="en-US" sz="2000" dirty="0" smtClean="0"/>
-              <a:t>board</a:t>
+              <a:t>    relay board</a:t>
             </a:r>
           </a:p>
           <a:p>
@@ -18653,11 +18578,7 @@
             </a:r>
             <a:r>
               <a:rPr lang="en-US" sz="2000" dirty="0" smtClean="0"/>
-              <a:t>motor to </a:t>
-            </a:r>
-            <a:r>
-              <a:rPr lang="en-US" sz="2000" dirty="0" smtClean="0"/>
-              <a:t>rotate each face</a:t>
+              <a:t>motor to rotate each face</a:t>
             </a:r>
             <a:endParaRPr lang="en-US" sz="2000" dirty="0"/>
           </a:p>
@@ -18668,15 +18589,7 @@
             </a:pPr>
             <a:r>
               <a:rPr lang="en-US" sz="2000" dirty="0" smtClean="0"/>
-              <a:t>90/180 </a:t>
-            </a:r>
-            <a:r>
-              <a:rPr lang="en-US" sz="2000" dirty="0" smtClean="0"/>
-              <a:t>degree </a:t>
-            </a:r>
-            <a:r>
-              <a:rPr lang="en-US" sz="2000" dirty="0" smtClean="0"/>
-              <a:t>rotations clockwise or counter-clockwise</a:t>
+              <a:t>90/180 degree rotations clockwise or counter-clockwise</a:t>
             </a:r>
           </a:p>
           <a:p>
@@ -18693,23 +18606,7 @@
             </a:pPr>
             <a:r>
               <a:rPr lang="en-US" sz="2000" dirty="0" smtClean="0"/>
-              <a:t>Controlled by an FPGA </a:t>
-            </a:r>
-            <a:r>
-              <a:rPr lang="en-US" sz="2000" dirty="0" smtClean="0"/>
-              <a:t>and </a:t>
-            </a:r>
-            <a:r>
-              <a:rPr lang="en-US" sz="2000" dirty="0" smtClean="0"/>
-              <a:t>proprietary motor </a:t>
-            </a:r>
-            <a:r>
-              <a:rPr lang="en-US" sz="2000" dirty="0" smtClean="0"/>
-              <a:t>control </a:t>
-            </a:r>
-            <a:r>
-              <a:rPr lang="en-US" sz="2000" dirty="0" smtClean="0"/>
-              <a:t>board</a:t>
+              <a:t>Controlled by an FPGA and proprietary motor control board</a:t>
             </a:r>
           </a:p>
           <a:p>
@@ -18743,11 +18640,7 @@
             </a:pPr>
             <a:r>
               <a:rPr lang="en-US" sz="2000" dirty="0" smtClean="0"/>
-              <a:t>Break sensor </a:t>
-            </a:r>
-            <a:r>
-              <a:rPr lang="en-US" sz="2000" dirty="0" smtClean="0"/>
-              <a:t>for 90 degree </a:t>
+              <a:t>Break sensor for 90 degree </a:t>
             </a:r>
           </a:p>
           <a:p>
@@ -18757,15 +18650,7 @@
             </a:r>
             <a:r>
               <a:rPr lang="en-US" sz="2000" dirty="0" smtClean="0"/>
-              <a:t>  </a:t>
-            </a:r>
-            <a:r>
-              <a:rPr lang="en-US" sz="2000" dirty="0" smtClean="0"/>
-              <a:t>  alignment</a:t>
-            </a:r>
-            <a:r>
-              <a:rPr lang="en-US" sz="2000" dirty="0" smtClean="0"/>
-              <a:t>.</a:t>
+              <a:t>    alignment.</a:t>
             </a:r>
           </a:p>
           <a:p>
@@ -19523,8 +19408,15 @@
             </a:r>
             <a:r>
               <a:rPr lang="en-US" dirty="0" smtClean="0"/>
-              <a:t> 3 – Fastest robot to solve a Rubik’s Cube (3.253s) [1].</a:t>
-            </a:r>
+              <a:t> 3 – Fastest robot to solve a Rubik’s Cube (3.253s) [1]</a:t>
+            </a:r>
+            <a:r>
+              <a:rPr lang="en-US" dirty="0" smtClean="0"/>
+              <a:t>.</a:t>
+            </a:r>
+          </a:p>
+          <a:p>
+            <a:endParaRPr lang="en-US" dirty="0" smtClean="0"/>
           </a:p>
           <a:p>
             <a:endParaRPr lang="en-US" dirty="0"/>
@@ -19560,6 +19452,47 @@
           </a:prstGeom>
         </p:spPr>
       </p:pic>
+      <p:sp>
+        <p:nvSpPr>
+          <p:cNvPr id="4" name="Rectangle 3"/>
+          <p:cNvSpPr/>
+          <p:nvPr/>
+        </p:nvSpPr>
+        <p:spPr>
+          <a:xfrm>
+            <a:off x="3137827" y="6027751"/>
+            <a:ext cx="3065901" cy="369332"/>
+          </a:xfrm>
+          <a:prstGeom prst="rect">
+            <a:avLst/>
+          </a:prstGeom>
+        </p:spPr>
+        <p:txBody>
+          <a:bodyPr wrap="none">
+            <a:spAutoFit/>
+          </a:bodyPr>
+          <a:lstStyle/>
+          <a:p>
+            <a:r>
+              <a:rPr lang="en-US" dirty="0">
+                <a:hlinkClick r:id="rId4"/>
+              </a:rPr>
+              <a:t>https://youtu.be/</a:t>
+            </a:r>
+            <a:r>
+              <a:rPr lang="en-US" dirty="0" smtClean="0">
+                <a:hlinkClick r:id="rId4"/>
+              </a:rPr>
+              <a:t>X0pFZG7j5cE</a:t>
+            </a:r>
+            <a:r>
+              <a:rPr lang="en-US" dirty="0" smtClean="0"/>
+              <a:t> </a:t>
+            </a:r>
+            <a:endParaRPr lang="en-US" dirty="0"/>
+          </a:p>
+        </p:txBody>
+      </p:sp>
     </p:spTree>
     <p:extLst>
       <p:ext uri="{BB962C8B-B14F-4D97-AF65-F5344CB8AC3E}">
@@ -19573,7 +19506,77 @@
   <p:timing>
     <p:tnLst>
       <p:par>
-        <p:cTn xmlns:p14="http://schemas.microsoft.com/office/powerpoint/2010/main" id="1" dur="indefinite" restart="never" nodeType="tmRoot"/>
+        <p:cTn xmlns:p14="http://schemas.microsoft.com/office/powerpoint/2010/main" id="1" dur="indefinite" restart="never" nodeType="tmRoot">
+          <p:childTnLst>
+            <p:seq concurrent="1" nextAc="seek">
+              <p:cTn id="2" dur="indefinite" nodeType="mainSeq">
+                <p:childTnLst>
+                  <p:par>
+                    <p:cTn id="3" fill="hold">
+                      <p:stCondLst>
+                        <p:cond delay="indefinite"/>
+                      </p:stCondLst>
+                      <p:childTnLst>
+                        <p:par>
+                          <p:cTn id="4" fill="hold">
+                            <p:stCondLst>
+                              <p:cond delay="0"/>
+                            </p:stCondLst>
+                            <p:childTnLst>
+                              <p:par>
+                                <p:cTn id="5" presetID="1" presetClass="mediacall" presetSubtype="0" fill="hold" nodeType="clickEffect">
+                                  <p:stCondLst>
+                                    <p:cond delay="0"/>
+                                  </p:stCondLst>
+                                  <p:childTnLst>
+                                    <p:cmd type="call" cmd="playFrom(0.0)">
+                                      <p:cBhvr>
+                                        <p:cTn id="6" dur="1" fill="hold"/>
+                                        <p:tgtEl>
+                                          <p:spTgt spid="6"/>
+                                        </p:tgtEl>
+                                      </p:cBhvr>
+                                    </p:cmd>
+                                  </p:childTnLst>
+                                </p:cTn>
+                              </p:par>
+                            </p:childTnLst>
+                          </p:cTn>
+                        </p:par>
+                      </p:childTnLst>
+                    </p:cTn>
+                  </p:par>
+                </p:childTnLst>
+              </p:cTn>
+              <p:prevCondLst>
+                <p:cond evt="onPrev" delay="0">
+                  <p:tgtEl>
+                    <p:sldTgt/>
+                  </p:tgtEl>
+                </p:cond>
+              </p:prevCondLst>
+              <p:nextCondLst>
+                <p:cond evt="onNext" delay="0">
+                  <p:tgtEl>
+                    <p:sldTgt/>
+                  </p:tgtEl>
+                </p:cond>
+              </p:nextCondLst>
+            </p:seq>
+            <p:video>
+              <p:cMediaNode vol="80000">
+                <p:cTn id="7" display="0">
+                  <p:stCondLst>
+                    <p:cond delay="indefinite"/>
+                  </p:stCondLst>
+                </p:cTn>
+                <p:tgtEl>
+                  <p:spTgt spid="6"/>
+                </p:tgtEl>
+              </p:cMediaNode>
+            </p:video>
+          </p:childTnLst>
+        </p:cTn>
       </p:par>
     </p:tnLst>
   </p:timing>
@@ -21758,7 +21761,7 @@
   <a:extraClrSchemeLst/>
   <a:extLst>
     <a:ext uri="{05A4C25C-085E-4340-85A3-A5531E510DB2}">
-      <thm15:themeFamily xmlns="" xmlns:thm15="http://schemas.microsoft.com/office/thememl/2012/main" name="Circuit" id="{0AC2F7E7-15F5-431C-B2A2-456FE929F56C}" vid="{0911B802-464C-4241-8DD9-B60FF88E379F}"/>
+      <thm15:themeFamily xmlns:thm15="http://schemas.microsoft.com/office/thememl/2012/main" xmlns="" name="Circuit" id="{0AC2F7E7-15F5-431C-B2A2-456FE929F56C}" vid="{0911B802-464C-4241-8DD9-B60FF88E379F}"/>
     </a:ext>
   </a:extLst>
 </a:theme>

</xml_diff>

<commit_message>
Added final presentation and supporting material.
This commit includes the PowerPoint that we used in our final
presentation, along with the supporting material used in the
presentation.
</commit_message>
<xml_diff>
--- a/Documents/Presentations/HerbertPresentation.pptx
+++ b/Documents/Presentations/HerbertPresentation.pptx
@@ -4421,7 +4421,7 @@
           <a:p>
             <a:fld id="{B3D6EF8A-A6D9-B040-9BC2-718C5C9E1F91}" type="datetimeFigureOut">
               <a:rPr lang="en-US" smtClean="0"/>
-              <a:t>4/29/15</a:t>
+              <a:t>12/10/15</a:t>
             </a:fld>
             <a:endParaRPr lang="en-US"/>
           </a:p>
@@ -4688,7 +4688,7 @@
           <a:p>
             <a:fld id="{B3D6EF8A-A6D9-B040-9BC2-718C5C9E1F91}" type="datetimeFigureOut">
               <a:rPr lang="en-US" smtClean="0"/>
-              <a:t>4/29/15</a:t>
+              <a:t>12/10/15</a:t>
             </a:fld>
             <a:endParaRPr lang="en-US"/>
           </a:p>
@@ -4884,7 +4884,7 @@
           <a:p>
             <a:fld id="{B3D6EF8A-A6D9-B040-9BC2-718C5C9E1F91}" type="datetimeFigureOut">
               <a:rPr lang="en-US" smtClean="0"/>
-              <a:t>4/29/15</a:t>
+              <a:t>12/10/15</a:t>
             </a:fld>
             <a:endParaRPr lang="en-US"/>
           </a:p>
@@ -5147,7 +5147,7 @@
           <a:p>
             <a:fld id="{B3D6EF8A-A6D9-B040-9BC2-718C5C9E1F91}" type="datetimeFigureOut">
               <a:rPr lang="en-US" smtClean="0"/>
-              <a:t>4/29/15</a:t>
+              <a:t>12/10/15</a:t>
             </a:fld>
             <a:endParaRPr lang="en-US"/>
           </a:p>
@@ -5581,7 +5581,7 @@
           <a:p>
             <a:fld id="{B3D6EF8A-A6D9-B040-9BC2-718C5C9E1F91}" type="datetimeFigureOut">
               <a:rPr lang="en-US" smtClean="0"/>
-              <a:t>4/29/15</a:t>
+              <a:t>12/10/15</a:t>
             </a:fld>
             <a:endParaRPr lang="en-US"/>
           </a:p>
@@ -6127,7 +6127,7 @@
           <a:p>
             <a:fld id="{B3D6EF8A-A6D9-B040-9BC2-718C5C9E1F91}" type="datetimeFigureOut">
               <a:rPr lang="en-US" smtClean="0"/>
-              <a:t>4/29/15</a:t>
+              <a:t>12/10/15</a:t>
             </a:fld>
             <a:endParaRPr lang="en-US"/>
           </a:p>
@@ -6847,7 +6847,7 @@
           <a:p>
             <a:fld id="{B3D6EF8A-A6D9-B040-9BC2-718C5C9E1F91}" type="datetimeFigureOut">
               <a:rPr lang="en-US" smtClean="0"/>
-              <a:t>4/29/15</a:t>
+              <a:t>12/10/15</a:t>
             </a:fld>
             <a:endParaRPr lang="en-US"/>
           </a:p>
@@ -7021,7 +7021,7 @@
           <a:p>
             <a:fld id="{B3D6EF8A-A6D9-B040-9BC2-718C5C9E1F91}" type="datetimeFigureOut">
               <a:rPr lang="en-US" smtClean="0"/>
-              <a:t>4/29/15</a:t>
+              <a:t>12/10/15</a:t>
             </a:fld>
             <a:endParaRPr lang="en-US"/>
           </a:p>
@@ -7201,7 +7201,7 @@
           <a:p>
             <a:fld id="{B3D6EF8A-A6D9-B040-9BC2-718C5C9E1F91}" type="datetimeFigureOut">
               <a:rPr lang="en-US" smtClean="0"/>
-              <a:t>4/29/15</a:t>
+              <a:t>12/10/15</a:t>
             </a:fld>
             <a:endParaRPr lang="en-US"/>
           </a:p>
@@ -7386,7 +7386,7 @@
           <a:p>
             <a:fld id="{B3D6EF8A-A6D9-B040-9BC2-718C5C9E1F91}" type="datetimeFigureOut">
               <a:rPr lang="en-US" smtClean="0"/>
-              <a:t>4/29/15</a:t>
+              <a:t>12/10/15</a:t>
             </a:fld>
             <a:endParaRPr lang="en-US"/>
           </a:p>
@@ -7646,7 +7646,7 @@
           <a:p>
             <a:fld id="{B3D6EF8A-A6D9-B040-9BC2-718C5C9E1F91}" type="datetimeFigureOut">
               <a:rPr lang="en-US" smtClean="0"/>
-              <a:t>4/29/15</a:t>
+              <a:t>12/10/15</a:t>
             </a:fld>
             <a:endParaRPr lang="en-US"/>
           </a:p>
@@ -7878,7 +7878,7 @@
           <a:p>
             <a:fld id="{B3D6EF8A-A6D9-B040-9BC2-718C5C9E1F91}" type="datetimeFigureOut">
               <a:rPr lang="en-US" smtClean="0"/>
-              <a:t>4/29/15</a:t>
+              <a:t>12/10/15</a:t>
             </a:fld>
             <a:endParaRPr lang="en-US"/>
           </a:p>
@@ -8259,7 +8259,7 @@
           <a:p>
             <a:fld id="{B3D6EF8A-A6D9-B040-9BC2-718C5C9E1F91}" type="datetimeFigureOut">
               <a:rPr lang="en-US" smtClean="0"/>
-              <a:t>4/29/15</a:t>
+              <a:t>12/10/15</a:t>
             </a:fld>
             <a:endParaRPr lang="en-US"/>
           </a:p>
@@ -8377,7 +8377,7 @@
           <a:p>
             <a:fld id="{B3D6EF8A-A6D9-B040-9BC2-718C5C9E1F91}" type="datetimeFigureOut">
               <a:rPr lang="en-US" smtClean="0"/>
-              <a:t>4/29/15</a:t>
+              <a:t>12/10/15</a:t>
             </a:fld>
             <a:endParaRPr lang="en-US"/>
           </a:p>
@@ -8472,7 +8472,7 @@
           <a:p>
             <a:fld id="{B3D6EF8A-A6D9-B040-9BC2-718C5C9E1F91}" type="datetimeFigureOut">
               <a:rPr lang="en-US" smtClean="0"/>
-              <a:t>4/29/15</a:t>
+              <a:t>12/10/15</a:t>
             </a:fld>
             <a:endParaRPr lang="en-US"/>
           </a:p>
@@ -8721,7 +8721,7 @@
           <a:p>
             <a:fld id="{B3D6EF8A-A6D9-B040-9BC2-718C5C9E1F91}" type="datetimeFigureOut">
               <a:rPr lang="en-US" smtClean="0"/>
-              <a:t>4/29/15</a:t>
+              <a:t>12/10/15</a:t>
             </a:fld>
             <a:endParaRPr lang="en-US"/>
           </a:p>
@@ -8973,7 +8973,7 @@
           <a:p>
             <a:fld id="{B3D6EF8A-A6D9-B040-9BC2-718C5C9E1F91}" type="datetimeFigureOut">
               <a:rPr lang="en-US" smtClean="0"/>
-              <a:t>4/29/15</a:t>
+              <a:t>12/10/15</a:t>
             </a:fld>
             <a:endParaRPr lang="en-US"/>
           </a:p>
@@ -12057,7 +12057,7 @@
           <a:p>
             <a:fld id="{B3D6EF8A-A6D9-B040-9BC2-718C5C9E1F91}" type="datetimeFigureOut">
               <a:rPr lang="en-US" smtClean="0"/>
-              <a:t>4/29/15</a:t>
+              <a:t>12/10/15</a:t>
             </a:fld>
             <a:endParaRPr lang="en-US"/>
           </a:p>
@@ -19408,11 +19408,7 @@
             </a:r>
             <a:r>
               <a:rPr lang="en-US" dirty="0" smtClean="0"/>
-              <a:t> 3 – Fastest robot to solve a Rubik’s Cube (3.253s) [1]</a:t>
-            </a:r>
-            <a:r>
-              <a:rPr lang="en-US" dirty="0" smtClean="0"/>
-              <a:t>.</a:t>
+              <a:t> 3 – Fastest robot to solve a Rubik’s Cube (3.253s) [1].</a:t>
             </a:r>
           </a:p>
           <a:p>
@@ -19676,7 +19672,11 @@
           <a:p>
             <a:r>
               <a:rPr lang="en-US" dirty="0" smtClean="0"/>
-              <a:t>Take Guinness </a:t>
+              <a:t>Possibly </a:t>
+            </a:r>
+            <a:r>
+              <a:rPr lang="en-US" dirty="0" smtClean="0"/>
+              <a:t>take Guinness </a:t>
             </a:r>
             <a:r>
               <a:rPr lang="en-US" dirty="0"/>
@@ -21176,7 +21176,7 @@
         </p:nvSpPr>
         <p:spPr>
           <a:xfrm>
-            <a:off x="856059" y="2205944"/>
+            <a:off x="856059" y="2097088"/>
             <a:ext cx="7429499" cy="3541714"/>
           </a:xfrm>
         </p:spPr>
@@ -21187,8 +21187,12 @@
           <a:lstStyle/>
           <a:p>
             <a:r>
+              <a:rPr lang="en-US" smtClean="0"/>
+              <a:t>Two </a:t>
+            </a:r>
+            <a:r>
               <a:rPr lang="en-US" dirty="0" smtClean="0"/>
-              <a:t>Two cameras, one for three </a:t>
+              <a:t>cameras, one for three </a:t>
             </a:r>
             <a:r>
               <a:rPr lang="en-US" dirty="0"/>

</xml_diff>